<commit_message>
hopefully last commit ever :D
</commit_message>
<xml_diff>
--- a/docs/source/_static/presentation/Presentation1.pptx
+++ b/docs/source/_static/presentation/Presentation1.pptx
@@ -4,13 +4,18 @@
   <p:sldMasterIdLst>
     <p:sldMasterId id="2147483648" r:id="rId1"/>
   </p:sldMasterIdLst>
+  <p:notesMasterIdLst>
+    <p:notesMasterId r:id="rId10"/>
+  </p:notesMasterIdLst>
   <p:sldIdLst>
     <p:sldId id="256" r:id="rId2"/>
     <p:sldId id="257" r:id="rId3"/>
-    <p:sldId id="258" r:id="rId4"/>
-    <p:sldId id="259" r:id="rId5"/>
-    <p:sldId id="260" r:id="rId6"/>
-    <p:sldId id="261" r:id="rId7"/>
+    <p:sldId id="262" r:id="rId4"/>
+    <p:sldId id="258" r:id="rId5"/>
+    <p:sldId id="259" r:id="rId6"/>
+    <p:sldId id="260" r:id="rId7"/>
+    <p:sldId id="263" r:id="rId8"/>
+    <p:sldId id="261" r:id="rId9"/>
   </p:sldIdLst>
   <p:sldSz cx="12192000" cy="6858000"/>
   <p:notesSz cx="6858000" cy="9144000"/>
@@ -109,7 +114,3837 @@
       </a:defRPr>
     </a:lvl9pPr>
   </p:defaultTextStyle>
+  <p:extLst>
+    <p:ext uri="{EFAFB233-063F-42B5-8137-9DF3F51BA10A}">
+      <p15:sldGuideLst xmlns:p15="http://schemas.microsoft.com/office/powerpoint/2012/main"/>
+    </p:ext>
+  </p:extLst>
 </p:presentation>
+</file>
+
+<file path=ppt/notesMasters/notesMaster1.xml><?xml version="1.0" encoding="utf-8"?>
+<p:notesMaster xmlns:a="http://schemas.openxmlformats.org/drawingml/2006/main" xmlns:r="http://schemas.openxmlformats.org/officeDocument/2006/relationships" xmlns:p="http://schemas.openxmlformats.org/presentationml/2006/main">
+  <p:cSld>
+    <p:bg>
+      <p:bgRef idx="1001">
+        <a:schemeClr val="bg1"/>
+      </p:bgRef>
+    </p:bg>
+    <p:spTree>
+      <p:nvGrpSpPr>
+        <p:cNvPr id="1" name=""/>
+        <p:cNvGrpSpPr/>
+        <p:nvPr/>
+      </p:nvGrpSpPr>
+      <p:grpSpPr>
+        <a:xfrm>
+          <a:off x="0" y="0"/>
+          <a:ext cx="0" cy="0"/>
+          <a:chOff x="0" y="0"/>
+          <a:chExt cx="0" cy="0"/>
+        </a:xfrm>
+      </p:grpSpPr>
+      <p:sp>
+        <p:nvSpPr>
+          <p:cNvPr id="2" name="Kopfzeilenplatzhalter 1"/>
+          <p:cNvSpPr>
+            <a:spLocks noGrp="1"/>
+          </p:cNvSpPr>
+          <p:nvPr>
+            <p:ph type="hdr" sz="quarter"/>
+          </p:nvPr>
+        </p:nvSpPr>
+        <p:spPr>
+          <a:xfrm>
+            <a:off x="0" y="0"/>
+            <a:ext cx="2971800" cy="458788"/>
+          </a:xfrm>
+          <a:prstGeom prst="rect">
+            <a:avLst/>
+          </a:prstGeom>
+        </p:spPr>
+        <p:txBody>
+          <a:bodyPr vert="horz" lIns="91440" tIns="45720" rIns="91440" bIns="45720" rtlCol="0"/>
+          <a:lstStyle>
+            <a:lvl1pPr algn="l">
+              <a:defRPr sz="1200"/>
+            </a:lvl1pPr>
+          </a:lstStyle>
+          <a:p>
+            <a:endParaRPr lang="de-DE"/>
+          </a:p>
+        </p:txBody>
+      </p:sp>
+      <p:sp>
+        <p:nvSpPr>
+          <p:cNvPr id="3" name="Datumsplatzhalter 2"/>
+          <p:cNvSpPr>
+            <a:spLocks noGrp="1"/>
+          </p:cNvSpPr>
+          <p:nvPr>
+            <p:ph type="dt" idx="1"/>
+          </p:nvPr>
+        </p:nvSpPr>
+        <p:spPr>
+          <a:xfrm>
+            <a:off x="3884613" y="0"/>
+            <a:ext cx="2971800" cy="458788"/>
+          </a:xfrm>
+          <a:prstGeom prst="rect">
+            <a:avLst/>
+          </a:prstGeom>
+        </p:spPr>
+        <p:txBody>
+          <a:bodyPr vert="horz" lIns="91440" tIns="45720" rIns="91440" bIns="45720" rtlCol="0"/>
+          <a:lstStyle>
+            <a:lvl1pPr algn="r">
+              <a:defRPr sz="1200"/>
+            </a:lvl1pPr>
+          </a:lstStyle>
+          <a:p>
+            <a:fld id="{C438C96E-283E-7444-A472-0F5BD2DE7AA5}" type="datetimeFigureOut">
+              <a:rPr lang="de-DE" smtClean="0"/>
+              <a:t>05.07.17</a:t>
+            </a:fld>
+            <a:endParaRPr lang="de-DE"/>
+          </a:p>
+        </p:txBody>
+      </p:sp>
+      <p:sp>
+        <p:nvSpPr>
+          <p:cNvPr id="4" name="Folienbildplatzhalter 3"/>
+          <p:cNvSpPr>
+            <a:spLocks noGrp="1" noRot="1" noChangeAspect="1"/>
+          </p:cNvSpPr>
+          <p:nvPr>
+            <p:ph type="sldImg" idx="2"/>
+          </p:nvPr>
+        </p:nvSpPr>
+        <p:spPr>
+          <a:xfrm>
+            <a:off x="685800" y="1143000"/>
+            <a:ext cx="5486400" cy="3086100"/>
+          </a:xfrm>
+          <a:prstGeom prst="rect">
+            <a:avLst/>
+          </a:prstGeom>
+          <a:noFill/>
+          <a:ln w="12700">
+            <a:solidFill>
+              <a:prstClr val="black"/>
+            </a:solidFill>
+          </a:ln>
+        </p:spPr>
+        <p:txBody>
+          <a:bodyPr vert="horz" lIns="91440" tIns="45720" rIns="91440" bIns="45720" rtlCol="0" anchor="ctr"/>
+          <a:lstStyle/>
+          <a:p>
+            <a:endParaRPr lang="de-DE"/>
+          </a:p>
+        </p:txBody>
+      </p:sp>
+      <p:sp>
+        <p:nvSpPr>
+          <p:cNvPr id="5" name="Notizenplatzhalter 4"/>
+          <p:cNvSpPr>
+            <a:spLocks noGrp="1"/>
+          </p:cNvSpPr>
+          <p:nvPr>
+            <p:ph type="body" sz="quarter" idx="3"/>
+          </p:nvPr>
+        </p:nvSpPr>
+        <p:spPr>
+          <a:xfrm>
+            <a:off x="685800" y="4400550"/>
+            <a:ext cx="5486400" cy="3600450"/>
+          </a:xfrm>
+          <a:prstGeom prst="rect">
+            <a:avLst/>
+          </a:prstGeom>
+        </p:spPr>
+        <p:txBody>
+          <a:bodyPr vert="horz" lIns="91440" tIns="45720" rIns="91440" bIns="45720" rtlCol="0"/>
+          <a:lstStyle/>
+          <a:p>
+            <a:pPr lvl="0"/>
+            <a:r>
+              <a:rPr lang="de-DE" smtClean="0"/>
+              <a:t>Mastertextformat bearbeiten</a:t>
+            </a:r>
+          </a:p>
+          <a:p>
+            <a:pPr lvl="1"/>
+            <a:r>
+              <a:rPr lang="de-DE" smtClean="0"/>
+              <a:t>Zweite Ebene</a:t>
+            </a:r>
+          </a:p>
+          <a:p>
+            <a:pPr lvl="2"/>
+            <a:r>
+              <a:rPr lang="de-DE" smtClean="0"/>
+              <a:t>Dritte Ebene</a:t>
+            </a:r>
+          </a:p>
+          <a:p>
+            <a:pPr lvl="3"/>
+            <a:r>
+              <a:rPr lang="de-DE" smtClean="0"/>
+              <a:t>Vierte Ebene</a:t>
+            </a:r>
+          </a:p>
+          <a:p>
+            <a:pPr lvl="4"/>
+            <a:r>
+              <a:rPr lang="de-DE" smtClean="0"/>
+              <a:t>Fünfte Ebene</a:t>
+            </a:r>
+            <a:endParaRPr lang="de-DE"/>
+          </a:p>
+        </p:txBody>
+      </p:sp>
+      <p:sp>
+        <p:nvSpPr>
+          <p:cNvPr id="6" name="Fußzeilenplatzhalter 5"/>
+          <p:cNvSpPr>
+            <a:spLocks noGrp="1"/>
+          </p:cNvSpPr>
+          <p:nvPr>
+            <p:ph type="ftr" sz="quarter" idx="4"/>
+          </p:nvPr>
+        </p:nvSpPr>
+        <p:spPr>
+          <a:xfrm>
+            <a:off x="0" y="8685213"/>
+            <a:ext cx="2971800" cy="458787"/>
+          </a:xfrm>
+          <a:prstGeom prst="rect">
+            <a:avLst/>
+          </a:prstGeom>
+        </p:spPr>
+        <p:txBody>
+          <a:bodyPr vert="horz" lIns="91440" tIns="45720" rIns="91440" bIns="45720" rtlCol="0" anchor="b"/>
+          <a:lstStyle>
+            <a:lvl1pPr algn="l">
+              <a:defRPr sz="1200"/>
+            </a:lvl1pPr>
+          </a:lstStyle>
+          <a:p>
+            <a:endParaRPr lang="de-DE"/>
+          </a:p>
+        </p:txBody>
+      </p:sp>
+      <p:sp>
+        <p:nvSpPr>
+          <p:cNvPr id="7" name="Foliennummernplatzhalter 6"/>
+          <p:cNvSpPr>
+            <a:spLocks noGrp="1"/>
+          </p:cNvSpPr>
+          <p:nvPr>
+            <p:ph type="sldNum" sz="quarter" idx="5"/>
+          </p:nvPr>
+        </p:nvSpPr>
+        <p:spPr>
+          <a:xfrm>
+            <a:off x="3884613" y="8685213"/>
+            <a:ext cx="2971800" cy="458787"/>
+          </a:xfrm>
+          <a:prstGeom prst="rect">
+            <a:avLst/>
+          </a:prstGeom>
+        </p:spPr>
+        <p:txBody>
+          <a:bodyPr vert="horz" lIns="91440" tIns="45720" rIns="91440" bIns="45720" rtlCol="0" anchor="b"/>
+          <a:lstStyle>
+            <a:lvl1pPr algn="r">
+              <a:defRPr sz="1200"/>
+            </a:lvl1pPr>
+          </a:lstStyle>
+          <a:p>
+            <a:fld id="{FF15405E-4AB1-1C4A-8F75-D830CB03AB8E}" type="slidenum">
+              <a:rPr lang="de-DE" smtClean="0"/>
+              <a:t>‹#›</a:t>
+            </a:fld>
+            <a:endParaRPr lang="de-DE"/>
+          </a:p>
+        </p:txBody>
+      </p:sp>
+    </p:spTree>
+    <p:extLst>
+      <p:ext uri="{BB962C8B-B14F-4D97-AF65-F5344CB8AC3E}">
+        <p14:creationId xmlns:p14="http://schemas.microsoft.com/office/powerpoint/2010/main" val="1980857290"/>
+      </p:ext>
+    </p:extLst>
+  </p:cSld>
+  <p:clrMap bg1="lt1" tx1="dk1" bg2="lt2" tx2="dk2" accent1="accent1" accent2="accent2" accent3="accent3" accent4="accent4" accent5="accent5" accent6="accent6" hlink="hlink" folHlink="folHlink"/>
+  <p:notesStyle>
+    <a:lvl1pPr marL="0" algn="l" defTabSz="914400" rtl="0" eaLnBrk="1" latinLnBrk="0" hangingPunct="1">
+      <a:defRPr sz="1200" kern="1200">
+        <a:solidFill>
+          <a:schemeClr val="tx1"/>
+        </a:solidFill>
+        <a:latin typeface="+mn-lt"/>
+        <a:ea typeface="+mn-ea"/>
+        <a:cs typeface="+mn-cs"/>
+      </a:defRPr>
+    </a:lvl1pPr>
+    <a:lvl2pPr marL="457200" algn="l" defTabSz="914400" rtl="0" eaLnBrk="1" latinLnBrk="0" hangingPunct="1">
+      <a:defRPr sz="1200" kern="1200">
+        <a:solidFill>
+          <a:schemeClr val="tx1"/>
+        </a:solidFill>
+        <a:latin typeface="+mn-lt"/>
+        <a:ea typeface="+mn-ea"/>
+        <a:cs typeface="+mn-cs"/>
+      </a:defRPr>
+    </a:lvl2pPr>
+    <a:lvl3pPr marL="914400" algn="l" defTabSz="914400" rtl="0" eaLnBrk="1" latinLnBrk="0" hangingPunct="1">
+      <a:defRPr sz="1200" kern="1200">
+        <a:solidFill>
+          <a:schemeClr val="tx1"/>
+        </a:solidFill>
+        <a:latin typeface="+mn-lt"/>
+        <a:ea typeface="+mn-ea"/>
+        <a:cs typeface="+mn-cs"/>
+      </a:defRPr>
+    </a:lvl3pPr>
+    <a:lvl4pPr marL="1371600" algn="l" defTabSz="914400" rtl="0" eaLnBrk="1" latinLnBrk="0" hangingPunct="1">
+      <a:defRPr sz="1200" kern="1200">
+        <a:solidFill>
+          <a:schemeClr val="tx1"/>
+        </a:solidFill>
+        <a:latin typeface="+mn-lt"/>
+        <a:ea typeface="+mn-ea"/>
+        <a:cs typeface="+mn-cs"/>
+      </a:defRPr>
+    </a:lvl4pPr>
+    <a:lvl5pPr marL="1828800" algn="l" defTabSz="914400" rtl="0" eaLnBrk="1" latinLnBrk="0" hangingPunct="1">
+      <a:defRPr sz="1200" kern="1200">
+        <a:solidFill>
+          <a:schemeClr val="tx1"/>
+        </a:solidFill>
+        <a:latin typeface="+mn-lt"/>
+        <a:ea typeface="+mn-ea"/>
+        <a:cs typeface="+mn-cs"/>
+      </a:defRPr>
+    </a:lvl5pPr>
+    <a:lvl6pPr marL="2286000" algn="l" defTabSz="914400" rtl="0" eaLnBrk="1" latinLnBrk="0" hangingPunct="1">
+      <a:defRPr sz="1200" kern="1200">
+        <a:solidFill>
+          <a:schemeClr val="tx1"/>
+        </a:solidFill>
+        <a:latin typeface="+mn-lt"/>
+        <a:ea typeface="+mn-ea"/>
+        <a:cs typeface="+mn-cs"/>
+      </a:defRPr>
+    </a:lvl6pPr>
+    <a:lvl7pPr marL="2743200" algn="l" defTabSz="914400" rtl="0" eaLnBrk="1" latinLnBrk="0" hangingPunct="1">
+      <a:defRPr sz="1200" kern="1200">
+        <a:solidFill>
+          <a:schemeClr val="tx1"/>
+        </a:solidFill>
+        <a:latin typeface="+mn-lt"/>
+        <a:ea typeface="+mn-ea"/>
+        <a:cs typeface="+mn-cs"/>
+      </a:defRPr>
+    </a:lvl7pPr>
+    <a:lvl8pPr marL="3200400" algn="l" defTabSz="914400" rtl="0" eaLnBrk="1" latinLnBrk="0" hangingPunct="1">
+      <a:defRPr sz="1200" kern="1200">
+        <a:solidFill>
+          <a:schemeClr val="tx1"/>
+        </a:solidFill>
+        <a:latin typeface="+mn-lt"/>
+        <a:ea typeface="+mn-ea"/>
+        <a:cs typeface="+mn-cs"/>
+      </a:defRPr>
+    </a:lvl8pPr>
+    <a:lvl9pPr marL="3657600" algn="l" defTabSz="914400" rtl="0" eaLnBrk="1" latinLnBrk="0" hangingPunct="1">
+      <a:defRPr sz="1200" kern="1200">
+        <a:solidFill>
+          <a:schemeClr val="tx1"/>
+        </a:solidFill>
+        <a:latin typeface="+mn-lt"/>
+        <a:ea typeface="+mn-ea"/>
+        <a:cs typeface="+mn-cs"/>
+      </a:defRPr>
+    </a:lvl9pPr>
+  </p:notesStyle>
+</p:notesMaster>
+</file>
+
+<file path=ppt/notesSlides/notesSlide1.xml><?xml version="1.0" encoding="utf-8"?>
+<p:notes xmlns:a="http://schemas.openxmlformats.org/drawingml/2006/main" xmlns:r="http://schemas.openxmlformats.org/officeDocument/2006/relationships" xmlns:p="http://schemas.openxmlformats.org/presentationml/2006/main">
+  <p:cSld>
+    <p:spTree>
+      <p:nvGrpSpPr>
+        <p:cNvPr id="1" name=""/>
+        <p:cNvGrpSpPr/>
+        <p:nvPr/>
+      </p:nvGrpSpPr>
+      <p:grpSpPr>
+        <a:xfrm>
+          <a:off x="0" y="0"/>
+          <a:ext cx="0" cy="0"/>
+          <a:chOff x="0" y="0"/>
+          <a:chExt cx="0" cy="0"/>
+        </a:xfrm>
+      </p:grpSpPr>
+      <p:sp>
+        <p:nvSpPr>
+          <p:cNvPr id="2" name="Folienbildplatzhalter 1"/>
+          <p:cNvSpPr>
+            <a:spLocks noGrp="1" noRot="1" noChangeAspect="1"/>
+          </p:cNvSpPr>
+          <p:nvPr>
+            <p:ph type="sldImg"/>
+          </p:nvPr>
+        </p:nvSpPr>
+        <p:spPr/>
+      </p:sp>
+      <p:sp>
+        <p:nvSpPr>
+          <p:cNvPr id="3" name="Notizenplatzhalter 2"/>
+          <p:cNvSpPr>
+            <a:spLocks noGrp="1"/>
+          </p:cNvSpPr>
+          <p:nvPr>
+            <p:ph type="body" idx="1"/>
+          </p:nvPr>
+        </p:nvSpPr>
+        <p:spPr/>
+        <p:txBody>
+          <a:bodyPr/>
+          <a:lstStyle/>
+          <a:p>
+            <a:pPr marL="171450" lvl="0" indent="-171450">
+              <a:buFont typeface="Arial" charset="0"/>
+              <a:buChar char="•"/>
+            </a:pPr>
+            <a:r>
+              <a:rPr lang="de-DE" sz="1200" kern="1200" dirty="0" smtClean="0">
+                <a:solidFill>
+                  <a:schemeClr val="tx1"/>
+                </a:solidFill>
+                <a:effectLst/>
+                <a:latin typeface="+mn-lt"/>
+                <a:ea typeface="+mn-ea"/>
+                <a:cs typeface="+mn-cs"/>
+              </a:rPr>
+              <a:t>Einführung Samuel</a:t>
+            </a:r>
+            <a:endParaRPr lang="en-GB" sz="1200" kern="1200" dirty="0" smtClean="0">
+              <a:solidFill>
+                <a:schemeClr val="tx1"/>
+              </a:solidFill>
+              <a:effectLst/>
+              <a:latin typeface="+mn-lt"/>
+              <a:ea typeface="+mn-ea"/>
+              <a:cs typeface="+mn-cs"/>
+            </a:endParaRPr>
+          </a:p>
+          <a:p>
+            <a:pPr marL="171450" lvl="0" indent="-171450">
+              <a:buFont typeface="Arial" charset="0"/>
+              <a:buChar char="•"/>
+            </a:pPr>
+            <a:r>
+              <a:rPr lang="de-DE" sz="1200" kern="1200" dirty="0" smtClean="0">
+                <a:solidFill>
+                  <a:schemeClr val="tx1"/>
+                </a:solidFill>
+                <a:effectLst/>
+                <a:latin typeface="+mn-lt"/>
+                <a:ea typeface="+mn-ea"/>
+                <a:cs typeface="+mn-cs"/>
+              </a:rPr>
+              <a:t>Begrüßung</a:t>
+            </a:r>
+            <a:endParaRPr lang="en-GB" sz="1200" kern="1200" dirty="0" smtClean="0">
+              <a:solidFill>
+                <a:schemeClr val="tx1"/>
+              </a:solidFill>
+              <a:effectLst/>
+              <a:latin typeface="+mn-lt"/>
+              <a:ea typeface="+mn-ea"/>
+              <a:cs typeface="+mn-cs"/>
+            </a:endParaRPr>
+          </a:p>
+          <a:p>
+            <a:pPr marL="171450" lvl="0" indent="-171450">
+              <a:buFont typeface="Arial" charset="0"/>
+              <a:buChar char="•"/>
+            </a:pPr>
+            <a:r>
+              <a:rPr lang="de-DE" sz="1200" kern="1200" dirty="0" smtClean="0">
+                <a:solidFill>
+                  <a:schemeClr val="tx1"/>
+                </a:solidFill>
+                <a:effectLst/>
+                <a:latin typeface="+mn-lt"/>
+                <a:ea typeface="+mn-ea"/>
+                <a:cs typeface="+mn-cs"/>
+              </a:rPr>
+              <a:t>Frühlingsbeginn Wetter sehr wechselhaft</a:t>
+            </a:r>
+            <a:endParaRPr lang="en-GB" sz="1200" kern="1200" dirty="0" smtClean="0">
+              <a:solidFill>
+                <a:schemeClr val="tx1"/>
+              </a:solidFill>
+              <a:effectLst/>
+              <a:latin typeface="+mn-lt"/>
+              <a:ea typeface="+mn-ea"/>
+              <a:cs typeface="+mn-cs"/>
+            </a:endParaRPr>
+          </a:p>
+          <a:p>
+            <a:pPr marL="171450" lvl="0" indent="-171450">
+              <a:buFont typeface="Arial" charset="0"/>
+              <a:buChar char="•"/>
+            </a:pPr>
+            <a:r>
+              <a:rPr lang="de-DE" sz="1200" kern="1200" dirty="0" smtClean="0">
+                <a:solidFill>
+                  <a:schemeClr val="tx1"/>
+                </a:solidFill>
+                <a:effectLst/>
+                <a:latin typeface="+mn-lt"/>
+                <a:ea typeface="+mn-ea"/>
+                <a:cs typeface="+mn-cs"/>
+              </a:rPr>
+              <a:t>Hab mir Frage gestellt wie viele Sonnenstunden der Tag an einen bestimmten Standort hatte</a:t>
+            </a:r>
+            <a:endParaRPr lang="en-GB" sz="1200" kern="1200" dirty="0" smtClean="0">
+              <a:solidFill>
+                <a:schemeClr val="tx1"/>
+              </a:solidFill>
+              <a:effectLst/>
+              <a:latin typeface="+mn-lt"/>
+              <a:ea typeface="+mn-ea"/>
+              <a:cs typeface="+mn-cs"/>
+            </a:endParaRPr>
+          </a:p>
+          <a:p>
+            <a:pPr marL="171450" lvl="0" indent="-171450">
+              <a:buFont typeface="Arial" charset="0"/>
+              <a:buChar char="•"/>
+            </a:pPr>
+            <a:r>
+              <a:rPr lang="de-DE" sz="1200" kern="1200" dirty="0" smtClean="0">
+                <a:solidFill>
+                  <a:schemeClr val="tx1"/>
+                </a:solidFill>
+                <a:effectLst/>
+                <a:latin typeface="+mn-lt"/>
+                <a:ea typeface="+mn-ea"/>
+                <a:cs typeface="+mn-cs"/>
+              </a:rPr>
+              <a:t>Verschiedene Anwendungsbereiche: Landwirtschaft </a:t>
+            </a:r>
+            <a:r>
+              <a:rPr lang="de-DE" sz="1200" kern="1200" dirty="0" smtClean="0">
+                <a:solidFill>
+                  <a:schemeClr val="tx1"/>
+                </a:solidFill>
+                <a:effectLst/>
+                <a:latin typeface="+mn-lt"/>
+                <a:ea typeface="+mn-ea"/>
+                <a:cs typeface="+mn-cs"/>
+                <a:sym typeface="Wingdings" charset="2"/>
+              </a:rPr>
+              <a:t></a:t>
+            </a:r>
+            <a:r>
+              <a:rPr lang="de-DE" sz="1200" kern="1200" dirty="0" smtClean="0">
+                <a:solidFill>
+                  <a:schemeClr val="tx1"/>
+                </a:solidFill>
+                <a:effectLst/>
+                <a:latin typeface="+mn-lt"/>
+                <a:ea typeface="+mn-ea"/>
+                <a:cs typeface="+mn-cs"/>
+              </a:rPr>
+              <a:t> Optimierung Pflanzzeiten</a:t>
+            </a:r>
+            <a:endParaRPr lang="en-GB" sz="1200" kern="1200" dirty="0" smtClean="0">
+              <a:solidFill>
+                <a:schemeClr val="tx1"/>
+              </a:solidFill>
+              <a:effectLst/>
+              <a:latin typeface="+mn-lt"/>
+              <a:ea typeface="+mn-ea"/>
+              <a:cs typeface="+mn-cs"/>
+            </a:endParaRPr>
+          </a:p>
+          <a:p>
+            <a:pPr marL="171450" lvl="0" indent="-171450">
+              <a:buFont typeface="Arial" charset="0"/>
+              <a:buChar char="•"/>
+            </a:pPr>
+            <a:r>
+              <a:rPr lang="de-DE" sz="1200" kern="1200" dirty="0" smtClean="0">
+                <a:solidFill>
+                  <a:schemeClr val="tx1"/>
+                </a:solidFill>
+                <a:effectLst/>
+                <a:latin typeface="+mn-lt"/>
+                <a:ea typeface="+mn-ea"/>
+                <a:cs typeface="+mn-cs"/>
+              </a:rPr>
+              <a:t>Medizin </a:t>
+            </a:r>
+            <a:r>
+              <a:rPr lang="de-DE" sz="1200" kern="1200" dirty="0" smtClean="0">
+                <a:solidFill>
+                  <a:schemeClr val="tx1"/>
+                </a:solidFill>
+                <a:effectLst/>
+                <a:latin typeface="+mn-lt"/>
+                <a:ea typeface="+mn-ea"/>
+                <a:cs typeface="+mn-cs"/>
+                <a:sym typeface="Wingdings" charset="2"/>
+              </a:rPr>
+              <a:t></a:t>
+            </a:r>
+            <a:r>
+              <a:rPr lang="de-DE" sz="1200" kern="1200" dirty="0" smtClean="0">
+                <a:solidFill>
+                  <a:schemeClr val="tx1"/>
+                </a:solidFill>
+                <a:effectLst/>
+                <a:latin typeface="+mn-lt"/>
+                <a:ea typeface="+mn-ea"/>
+                <a:cs typeface="+mn-cs"/>
+              </a:rPr>
+              <a:t> Vitamin D</a:t>
+            </a:r>
+          </a:p>
+          <a:p>
+            <a:pPr marL="171450" lvl="0" indent="-171450">
+              <a:buFont typeface="Arial" charset="0"/>
+              <a:buChar char="•"/>
+            </a:pPr>
+            <a:endParaRPr lang="en-GB" sz="1200" kern="1200" dirty="0" smtClean="0">
+              <a:solidFill>
+                <a:schemeClr val="tx1"/>
+              </a:solidFill>
+              <a:effectLst/>
+              <a:latin typeface="+mn-lt"/>
+              <a:ea typeface="+mn-ea"/>
+              <a:cs typeface="+mn-cs"/>
+            </a:endParaRPr>
+          </a:p>
+          <a:p>
+            <a:r>
+              <a:rPr lang="de-DE" sz="1200" kern="1200" dirty="0" smtClean="0">
+                <a:solidFill>
+                  <a:schemeClr val="tx1"/>
+                </a:solidFill>
+                <a:effectLst/>
+                <a:latin typeface="+mn-lt"/>
+                <a:ea typeface="+mn-ea"/>
+                <a:cs typeface="+mn-cs"/>
+              </a:rPr>
+              <a:t>Ursprüngliche Idee:</a:t>
+            </a:r>
+            <a:endParaRPr lang="en-GB" sz="1200" kern="1200" dirty="0" smtClean="0">
+              <a:solidFill>
+                <a:schemeClr val="tx1"/>
+              </a:solidFill>
+              <a:effectLst/>
+              <a:latin typeface="+mn-lt"/>
+              <a:ea typeface="+mn-ea"/>
+              <a:cs typeface="+mn-cs"/>
+            </a:endParaRPr>
+          </a:p>
+          <a:p>
+            <a:r>
+              <a:rPr lang="de-DE" sz="1200" kern="1200" dirty="0" smtClean="0">
+                <a:solidFill>
+                  <a:schemeClr val="tx1"/>
+                </a:solidFill>
+                <a:effectLst/>
+                <a:latin typeface="+mn-lt"/>
+                <a:ea typeface="+mn-ea"/>
+                <a:cs typeface="+mn-cs"/>
+              </a:rPr>
+              <a:t>Erfassung der exakten Sonnenstunden an mehreren Standorten, zum Vergleich der Daten</a:t>
+            </a:r>
+            <a:endParaRPr lang="en-GB" sz="1200" kern="1200" dirty="0" smtClean="0">
+              <a:solidFill>
+                <a:schemeClr val="tx1"/>
+              </a:solidFill>
+              <a:effectLst/>
+              <a:latin typeface="+mn-lt"/>
+              <a:ea typeface="+mn-ea"/>
+              <a:cs typeface="+mn-cs"/>
+            </a:endParaRPr>
+          </a:p>
+          <a:p>
+            <a:r>
+              <a:rPr lang="de-DE" sz="1200" kern="1200" dirty="0" smtClean="0">
+                <a:solidFill>
+                  <a:schemeClr val="tx1"/>
+                </a:solidFill>
+                <a:effectLst/>
+                <a:latin typeface="+mn-lt"/>
+                <a:ea typeface="+mn-ea"/>
+                <a:cs typeface="+mn-cs"/>
+              </a:rPr>
+              <a:t>Dazu Erfassung verschiedener Helligkeitszustände: Sonne, Wolken mit verminderter Wolkendichte, Wolken mit verstärkter Wolkendichte, Dunkel</a:t>
+            </a:r>
+            <a:endParaRPr lang="en-GB" sz="1200" kern="1200" dirty="0" smtClean="0">
+              <a:solidFill>
+                <a:schemeClr val="tx1"/>
+              </a:solidFill>
+              <a:effectLst/>
+              <a:latin typeface="+mn-lt"/>
+              <a:ea typeface="+mn-ea"/>
+              <a:cs typeface="+mn-cs"/>
+            </a:endParaRPr>
+          </a:p>
+          <a:p>
+            <a:r>
+              <a:rPr lang="de-DE" sz="1200" kern="1200" dirty="0" smtClean="0">
+                <a:solidFill>
+                  <a:schemeClr val="tx1"/>
+                </a:solidFill>
+                <a:effectLst/>
+                <a:latin typeface="+mn-lt"/>
+                <a:ea typeface="+mn-ea"/>
+                <a:cs typeface="+mn-cs"/>
+              </a:rPr>
+              <a:t>Kombiniert man diese mit nun mit der jeweiligen Zeitdauer könnte man die Sonnenstunden berechnen.</a:t>
+            </a:r>
+          </a:p>
+          <a:p>
+            <a:endParaRPr lang="en-GB" sz="1200" kern="1200" dirty="0" smtClean="0">
+              <a:solidFill>
+                <a:schemeClr val="tx1"/>
+              </a:solidFill>
+              <a:effectLst/>
+              <a:latin typeface="+mn-lt"/>
+              <a:ea typeface="+mn-ea"/>
+              <a:cs typeface="+mn-cs"/>
+            </a:endParaRPr>
+          </a:p>
+          <a:p>
+            <a:r>
+              <a:rPr lang="de-DE" sz="1200" kern="1200" dirty="0" smtClean="0">
+                <a:solidFill>
+                  <a:schemeClr val="tx1"/>
+                </a:solidFill>
+                <a:effectLst/>
+                <a:latin typeface="+mn-lt"/>
+                <a:ea typeface="+mn-ea"/>
+                <a:cs typeface="+mn-cs"/>
+              </a:rPr>
+              <a:t>Um diese Aufgabe zu bewerkstelligen trugen wir alle benötigten Formeln zusammen</a:t>
+            </a:r>
+            <a:endParaRPr lang="en-GB" sz="1200" kern="1200" dirty="0" smtClean="0">
+              <a:solidFill>
+                <a:schemeClr val="tx1"/>
+              </a:solidFill>
+              <a:effectLst/>
+              <a:latin typeface="+mn-lt"/>
+              <a:ea typeface="+mn-ea"/>
+              <a:cs typeface="+mn-cs"/>
+            </a:endParaRPr>
+          </a:p>
+          <a:p>
+            <a:r>
+              <a:rPr lang="de-DE" sz="1200" kern="1200" dirty="0" smtClean="0">
+                <a:solidFill>
+                  <a:schemeClr val="tx1"/>
+                </a:solidFill>
+                <a:effectLst/>
+                <a:latin typeface="+mn-lt"/>
+                <a:ea typeface="+mn-ea"/>
+                <a:cs typeface="+mn-cs"/>
+              </a:rPr>
+              <a:t>Jedoch gaben die von uns gewählten Messgeräte keine Auskunft über physikalischen Einheiten </a:t>
+            </a:r>
+            <a:r>
+              <a:rPr lang="de-DE" sz="1200" kern="1200" dirty="0" smtClean="0">
+                <a:solidFill>
+                  <a:schemeClr val="tx1"/>
+                </a:solidFill>
+                <a:effectLst/>
+                <a:latin typeface="+mn-lt"/>
+                <a:ea typeface="+mn-ea"/>
+                <a:cs typeface="+mn-cs"/>
+                <a:sym typeface="Wingdings" charset="2"/>
+              </a:rPr>
+              <a:t></a:t>
+            </a:r>
+            <a:r>
+              <a:rPr lang="de-DE" sz="1200" kern="1200" dirty="0" smtClean="0">
+                <a:solidFill>
+                  <a:schemeClr val="tx1"/>
+                </a:solidFill>
+                <a:effectLst/>
+                <a:latin typeface="+mn-lt"/>
+                <a:ea typeface="+mn-ea"/>
+                <a:cs typeface="+mn-cs"/>
+              </a:rPr>
+              <a:t> LUX</a:t>
+            </a:r>
+          </a:p>
+          <a:p>
+            <a:endParaRPr lang="en-GB" sz="1200" kern="1200" dirty="0" smtClean="0">
+              <a:solidFill>
+                <a:schemeClr val="tx1"/>
+              </a:solidFill>
+              <a:effectLst/>
+              <a:latin typeface="+mn-lt"/>
+              <a:ea typeface="+mn-ea"/>
+              <a:cs typeface="+mn-cs"/>
+            </a:endParaRPr>
+          </a:p>
+          <a:p>
+            <a:r>
+              <a:rPr lang="de-DE" sz="1200" kern="1200" dirty="0" smtClean="0">
+                <a:solidFill>
+                  <a:schemeClr val="tx1"/>
+                </a:solidFill>
+                <a:effectLst/>
+                <a:latin typeface="+mn-lt"/>
+                <a:ea typeface="+mn-ea"/>
+                <a:cs typeface="+mn-cs"/>
+              </a:rPr>
+              <a:t>Die hier für die Berechnung mit den Formeln benötigt werden</a:t>
+            </a:r>
+            <a:endParaRPr lang="en-GB" sz="1200" kern="1200" dirty="0" smtClean="0">
+              <a:solidFill>
+                <a:schemeClr val="tx1"/>
+              </a:solidFill>
+              <a:effectLst/>
+              <a:latin typeface="+mn-lt"/>
+              <a:ea typeface="+mn-ea"/>
+              <a:cs typeface="+mn-cs"/>
+            </a:endParaRPr>
+          </a:p>
+          <a:p>
+            <a:r>
+              <a:rPr lang="de-DE" sz="1200" kern="1200" dirty="0" smtClean="0">
+                <a:solidFill>
+                  <a:schemeClr val="tx1"/>
+                </a:solidFill>
+                <a:effectLst/>
+                <a:latin typeface="+mn-lt"/>
+                <a:ea typeface="+mn-ea"/>
+                <a:cs typeface="+mn-cs"/>
+              </a:rPr>
+              <a:t>Messung der Helligkeitswerte mit Hilfe eines Photowiderstandes, eines Kondensators und des </a:t>
+            </a:r>
+            <a:r>
+              <a:rPr lang="de-DE" sz="1200" kern="1200" dirty="0" err="1" smtClean="0">
+                <a:solidFill>
+                  <a:schemeClr val="tx1"/>
+                </a:solidFill>
+                <a:effectLst/>
+                <a:latin typeface="+mn-lt"/>
+                <a:ea typeface="+mn-ea"/>
+                <a:cs typeface="+mn-cs"/>
+              </a:rPr>
+              <a:t>Raspberry</a:t>
+            </a:r>
+            <a:r>
+              <a:rPr lang="de-DE" sz="1200" kern="1200" dirty="0" smtClean="0">
+                <a:solidFill>
+                  <a:schemeClr val="tx1"/>
+                </a:solidFill>
+                <a:effectLst/>
+                <a:latin typeface="+mn-lt"/>
+                <a:ea typeface="+mn-ea"/>
+                <a:cs typeface="+mn-cs"/>
+              </a:rPr>
+              <a:t> </a:t>
+            </a:r>
+            <a:r>
+              <a:rPr lang="de-DE" sz="1200" kern="1200" dirty="0" err="1" smtClean="0">
+                <a:solidFill>
+                  <a:schemeClr val="tx1"/>
+                </a:solidFill>
+                <a:effectLst/>
+                <a:latin typeface="+mn-lt"/>
+                <a:ea typeface="+mn-ea"/>
+                <a:cs typeface="+mn-cs"/>
+              </a:rPr>
+              <a:t>Pi‘s</a:t>
+            </a:r>
+            <a:endParaRPr lang="de-DE" sz="1200" kern="1200" dirty="0" smtClean="0">
+              <a:solidFill>
+                <a:schemeClr val="tx1"/>
+              </a:solidFill>
+              <a:effectLst/>
+              <a:latin typeface="+mn-lt"/>
+              <a:ea typeface="+mn-ea"/>
+              <a:cs typeface="+mn-cs"/>
+            </a:endParaRPr>
+          </a:p>
+          <a:p>
+            <a:endParaRPr lang="en-GB" sz="1200" kern="1200" dirty="0" smtClean="0">
+              <a:solidFill>
+                <a:schemeClr val="tx1"/>
+              </a:solidFill>
+              <a:effectLst/>
+              <a:latin typeface="+mn-lt"/>
+              <a:ea typeface="+mn-ea"/>
+              <a:cs typeface="+mn-cs"/>
+            </a:endParaRPr>
+          </a:p>
+          <a:p>
+            <a:r>
+              <a:rPr lang="de-DE" sz="1200" kern="1200" dirty="0" smtClean="0">
+                <a:solidFill>
+                  <a:schemeClr val="tx1"/>
+                </a:solidFill>
+                <a:effectLst/>
+                <a:latin typeface="+mn-lt"/>
+                <a:ea typeface="+mn-ea"/>
+                <a:cs typeface="+mn-cs"/>
+              </a:rPr>
+              <a:t>Es wird die Dauer gemessen die der Kondensator braucht um aufzuladen</a:t>
+            </a:r>
+            <a:endParaRPr lang="en-GB" sz="1200" kern="1200" dirty="0" smtClean="0">
+              <a:solidFill>
+                <a:schemeClr val="tx1"/>
+              </a:solidFill>
+              <a:effectLst/>
+              <a:latin typeface="+mn-lt"/>
+              <a:ea typeface="+mn-ea"/>
+              <a:cs typeface="+mn-cs"/>
+            </a:endParaRPr>
+          </a:p>
+          <a:p>
+            <a:r>
+              <a:rPr lang="de-DE" sz="1200" kern="1200" dirty="0" smtClean="0">
+                <a:solidFill>
+                  <a:schemeClr val="tx1"/>
+                </a:solidFill>
+                <a:effectLst/>
+                <a:latin typeface="+mn-lt"/>
+                <a:ea typeface="+mn-ea"/>
+                <a:cs typeface="+mn-cs"/>
+              </a:rPr>
+              <a:t>Diese Zeit kann benutzt werden um Rückschlüsse über die derzeitige Helligkeit zu liefern</a:t>
+            </a:r>
+            <a:endParaRPr lang="en-GB" sz="1200" kern="1200" dirty="0" smtClean="0">
+              <a:solidFill>
+                <a:schemeClr val="tx1"/>
+              </a:solidFill>
+              <a:effectLst/>
+              <a:latin typeface="+mn-lt"/>
+              <a:ea typeface="+mn-ea"/>
+              <a:cs typeface="+mn-cs"/>
+            </a:endParaRPr>
+          </a:p>
+          <a:p>
+            <a:r>
+              <a:rPr lang="de-DE" sz="1200" kern="1200" dirty="0" smtClean="0">
+                <a:solidFill>
+                  <a:schemeClr val="tx1"/>
+                </a:solidFill>
+                <a:effectLst/>
+                <a:latin typeface="+mn-lt"/>
+                <a:ea typeface="+mn-ea"/>
+                <a:cs typeface="+mn-cs"/>
+              </a:rPr>
+              <a:t>Aufgrund der ungenauen Messergebnisse verwarfen wir unsere ursprüngliche Idee</a:t>
+            </a:r>
+          </a:p>
+          <a:p>
+            <a:endParaRPr lang="en-GB" sz="1200" kern="1200" dirty="0" smtClean="0">
+              <a:solidFill>
+                <a:schemeClr val="tx1"/>
+              </a:solidFill>
+              <a:effectLst/>
+              <a:latin typeface="+mn-lt"/>
+              <a:ea typeface="+mn-ea"/>
+              <a:cs typeface="+mn-cs"/>
+            </a:endParaRPr>
+          </a:p>
+          <a:p>
+            <a:r>
+              <a:rPr lang="de-DE" sz="1200" kern="1200" dirty="0" smtClean="0">
+                <a:solidFill>
+                  <a:schemeClr val="tx1"/>
+                </a:solidFill>
+                <a:effectLst/>
+                <a:latin typeface="+mn-lt"/>
+                <a:ea typeface="+mn-ea"/>
+                <a:cs typeface="+mn-cs"/>
+              </a:rPr>
+              <a:t>Umgesetzt wurde:</a:t>
+            </a:r>
+            <a:endParaRPr lang="en-GB" sz="1200" kern="1200" dirty="0" smtClean="0">
+              <a:solidFill>
+                <a:schemeClr val="tx1"/>
+              </a:solidFill>
+              <a:effectLst/>
+              <a:latin typeface="+mn-lt"/>
+              <a:ea typeface="+mn-ea"/>
+              <a:cs typeface="+mn-cs"/>
+            </a:endParaRPr>
+          </a:p>
+          <a:p>
+            <a:r>
+              <a:rPr lang="de-DE" sz="1200" kern="1200" dirty="0" smtClean="0">
+                <a:solidFill>
+                  <a:schemeClr val="tx1"/>
+                </a:solidFill>
+                <a:effectLst/>
+                <a:latin typeface="+mn-lt"/>
+                <a:ea typeface="+mn-ea"/>
+                <a:cs typeface="+mn-cs"/>
+              </a:rPr>
+              <a:t>Programm im Server-Client Verbund</a:t>
+            </a:r>
+            <a:endParaRPr lang="en-GB" sz="1200" kern="1200" dirty="0" smtClean="0">
+              <a:solidFill>
+                <a:schemeClr val="tx1"/>
+              </a:solidFill>
+              <a:effectLst/>
+              <a:latin typeface="+mn-lt"/>
+              <a:ea typeface="+mn-ea"/>
+              <a:cs typeface="+mn-cs"/>
+            </a:endParaRPr>
+          </a:p>
+          <a:p>
+            <a:r>
+              <a:rPr lang="de-DE" sz="1200" kern="1200" dirty="0" smtClean="0">
+                <a:solidFill>
+                  <a:schemeClr val="tx1"/>
+                </a:solidFill>
+                <a:effectLst/>
+                <a:latin typeface="+mn-lt"/>
+                <a:ea typeface="+mn-ea"/>
+                <a:cs typeface="+mn-cs"/>
+              </a:rPr>
+              <a:t>Client misst Lichtintensität im 5 Sekunden Intervall</a:t>
+            </a:r>
+            <a:endParaRPr lang="en-GB" sz="1200" kern="1200" dirty="0" smtClean="0">
+              <a:solidFill>
+                <a:schemeClr val="tx1"/>
+              </a:solidFill>
+              <a:effectLst/>
+              <a:latin typeface="+mn-lt"/>
+              <a:ea typeface="+mn-ea"/>
+              <a:cs typeface="+mn-cs"/>
+            </a:endParaRPr>
+          </a:p>
+          <a:p>
+            <a:r>
+              <a:rPr lang="de-DE" sz="1200" kern="1200" dirty="0" smtClean="0">
+                <a:solidFill>
+                  <a:schemeClr val="tx1"/>
+                </a:solidFill>
+                <a:effectLst/>
+                <a:latin typeface="+mn-lt"/>
+                <a:ea typeface="+mn-ea"/>
+                <a:cs typeface="+mn-cs"/>
+              </a:rPr>
+              <a:t>Schickt Daten alle 5 Minuten zum Server</a:t>
+            </a:r>
+          </a:p>
+          <a:p>
+            <a:endParaRPr lang="en-GB" sz="1200" kern="1200" dirty="0" smtClean="0">
+              <a:solidFill>
+                <a:schemeClr val="tx1"/>
+              </a:solidFill>
+              <a:effectLst/>
+              <a:latin typeface="+mn-lt"/>
+              <a:ea typeface="+mn-ea"/>
+              <a:cs typeface="+mn-cs"/>
+            </a:endParaRPr>
+          </a:p>
+          <a:p>
+            <a:r>
+              <a:rPr lang="de-DE" sz="1200" kern="1200" dirty="0" smtClean="0">
+                <a:solidFill>
+                  <a:schemeClr val="tx1"/>
+                </a:solidFill>
+                <a:effectLst/>
+                <a:latin typeface="+mn-lt"/>
+                <a:ea typeface="+mn-ea"/>
+                <a:cs typeface="+mn-cs"/>
+              </a:rPr>
+              <a:t>Da wir nur Werte gebrauchen können die gemessen werden währen die Sonne scheint </a:t>
+            </a:r>
+            <a:r>
+              <a:rPr lang="de-DE" sz="1200" kern="1200" dirty="0" smtClean="0">
+                <a:solidFill>
+                  <a:schemeClr val="tx1"/>
+                </a:solidFill>
+                <a:effectLst/>
+                <a:latin typeface="+mn-lt"/>
+                <a:ea typeface="+mn-ea"/>
+                <a:cs typeface="+mn-cs"/>
+                <a:sym typeface="Wingdings" charset="2"/>
+              </a:rPr>
+              <a:t></a:t>
+            </a:r>
+            <a:r>
+              <a:rPr lang="de-DE" sz="1200" kern="1200" dirty="0" smtClean="0">
+                <a:solidFill>
+                  <a:schemeClr val="tx1"/>
+                </a:solidFill>
+                <a:effectLst/>
+                <a:latin typeface="+mn-lt"/>
+                <a:ea typeface="+mn-ea"/>
+                <a:cs typeface="+mn-cs"/>
+              </a:rPr>
+              <a:t> Steffen erläutern</a:t>
+            </a:r>
+            <a:endParaRPr lang="en-GB" sz="1200" kern="1200" dirty="0" smtClean="0">
+              <a:solidFill>
+                <a:schemeClr val="tx1"/>
+              </a:solidFill>
+              <a:effectLst/>
+              <a:latin typeface="+mn-lt"/>
+              <a:ea typeface="+mn-ea"/>
+              <a:cs typeface="+mn-cs"/>
+            </a:endParaRPr>
+          </a:p>
+          <a:p>
+            <a:r>
+              <a:rPr lang="de-DE" sz="1200" kern="1200" dirty="0" smtClean="0">
+                <a:solidFill>
+                  <a:schemeClr val="tx1"/>
+                </a:solidFill>
+                <a:effectLst/>
+                <a:latin typeface="+mn-lt"/>
+                <a:ea typeface="+mn-ea"/>
+                <a:cs typeface="+mn-cs"/>
+              </a:rPr>
+              <a:t>Formel gefunden die anhand des Standortes die Sonnenaufgangs- sowie Sonnenuntergangszeit zu berechnet</a:t>
+            </a:r>
+            <a:endParaRPr lang="en-GB" sz="1200" kern="1200" dirty="0">
+              <a:solidFill>
+                <a:schemeClr val="tx1"/>
+              </a:solidFill>
+              <a:effectLst/>
+              <a:latin typeface="+mn-lt"/>
+              <a:ea typeface="+mn-ea"/>
+              <a:cs typeface="+mn-cs"/>
+            </a:endParaRPr>
+          </a:p>
+        </p:txBody>
+      </p:sp>
+      <p:sp>
+        <p:nvSpPr>
+          <p:cNvPr id="4" name="Foliennummernplatzhalter 3"/>
+          <p:cNvSpPr>
+            <a:spLocks noGrp="1"/>
+          </p:cNvSpPr>
+          <p:nvPr>
+            <p:ph type="sldNum" sz="quarter" idx="10"/>
+          </p:nvPr>
+        </p:nvSpPr>
+        <p:spPr/>
+        <p:txBody>
+          <a:bodyPr/>
+          <a:lstStyle/>
+          <a:p>
+            <a:fld id="{FF15405E-4AB1-1C4A-8F75-D830CB03AB8E}" type="slidenum">
+              <a:rPr lang="de-DE" smtClean="0"/>
+              <a:t>2</a:t>
+            </a:fld>
+            <a:endParaRPr lang="de-DE"/>
+          </a:p>
+        </p:txBody>
+      </p:sp>
+    </p:spTree>
+    <p:extLst>
+      <p:ext uri="{BB962C8B-B14F-4D97-AF65-F5344CB8AC3E}">
+        <p14:creationId xmlns:p14="http://schemas.microsoft.com/office/powerpoint/2010/main" val="1976977236"/>
+      </p:ext>
+    </p:extLst>
+  </p:cSld>
+  <p:clrMapOvr>
+    <a:masterClrMapping/>
+  </p:clrMapOvr>
+</p:notes>
+</file>
+
+<file path=ppt/notesSlides/notesSlide2.xml><?xml version="1.0" encoding="utf-8"?>
+<p:notes xmlns:a="http://schemas.openxmlformats.org/drawingml/2006/main" xmlns:r="http://schemas.openxmlformats.org/officeDocument/2006/relationships" xmlns:p="http://schemas.openxmlformats.org/presentationml/2006/main">
+  <p:cSld>
+    <p:spTree>
+      <p:nvGrpSpPr>
+        <p:cNvPr id="1" name=""/>
+        <p:cNvGrpSpPr/>
+        <p:nvPr/>
+      </p:nvGrpSpPr>
+      <p:grpSpPr>
+        <a:xfrm>
+          <a:off x="0" y="0"/>
+          <a:ext cx="0" cy="0"/>
+          <a:chOff x="0" y="0"/>
+          <a:chExt cx="0" cy="0"/>
+        </a:xfrm>
+      </p:grpSpPr>
+      <p:sp>
+        <p:nvSpPr>
+          <p:cNvPr id="2" name="Slide Image Placeholder 1"/>
+          <p:cNvSpPr>
+            <a:spLocks noGrp="1" noRot="1" noChangeAspect="1"/>
+          </p:cNvSpPr>
+          <p:nvPr>
+            <p:ph type="sldImg"/>
+          </p:nvPr>
+        </p:nvSpPr>
+        <p:spPr/>
+      </p:sp>
+      <p:sp>
+        <p:nvSpPr>
+          <p:cNvPr id="3" name="Notes Placeholder 2"/>
+          <p:cNvSpPr>
+            <a:spLocks noGrp="1"/>
+          </p:cNvSpPr>
+          <p:nvPr>
+            <p:ph type="body" idx="1"/>
+          </p:nvPr>
+        </p:nvSpPr>
+        <p:spPr/>
+        <p:txBody>
+          <a:bodyPr/>
+          <a:lstStyle/>
+          <a:p>
+            <a:pPr marL="171450" lvl="0" indent="-171450">
+              <a:buFont typeface="Arial" charset="0"/>
+              <a:buChar char="•"/>
+            </a:pPr>
+            <a:r>
+              <a:rPr lang="de-DE" sz="1200" kern="1200" dirty="0" smtClean="0">
+                <a:solidFill>
+                  <a:schemeClr val="tx1"/>
+                </a:solidFill>
+                <a:effectLst/>
+                <a:latin typeface="+mn-lt"/>
+                <a:ea typeface="+mn-ea"/>
+                <a:cs typeface="+mn-cs"/>
+              </a:rPr>
+              <a:t>Einführung Samuel</a:t>
+            </a:r>
+            <a:endParaRPr lang="en-GB" sz="1200" kern="1200" dirty="0" smtClean="0">
+              <a:solidFill>
+                <a:schemeClr val="tx1"/>
+              </a:solidFill>
+              <a:effectLst/>
+              <a:latin typeface="+mn-lt"/>
+              <a:ea typeface="+mn-ea"/>
+              <a:cs typeface="+mn-cs"/>
+            </a:endParaRPr>
+          </a:p>
+          <a:p>
+            <a:pPr marL="171450" lvl="0" indent="-171450">
+              <a:buFont typeface="Arial" charset="0"/>
+              <a:buChar char="•"/>
+            </a:pPr>
+            <a:r>
+              <a:rPr lang="de-DE" sz="1200" kern="1200" dirty="0" smtClean="0">
+                <a:solidFill>
+                  <a:schemeClr val="tx1"/>
+                </a:solidFill>
+                <a:effectLst/>
+                <a:latin typeface="+mn-lt"/>
+                <a:ea typeface="+mn-ea"/>
+                <a:cs typeface="+mn-cs"/>
+              </a:rPr>
+              <a:t>Begrüßung</a:t>
+            </a:r>
+            <a:endParaRPr lang="en-GB" sz="1200" kern="1200" dirty="0" smtClean="0">
+              <a:solidFill>
+                <a:schemeClr val="tx1"/>
+              </a:solidFill>
+              <a:effectLst/>
+              <a:latin typeface="+mn-lt"/>
+              <a:ea typeface="+mn-ea"/>
+              <a:cs typeface="+mn-cs"/>
+            </a:endParaRPr>
+          </a:p>
+          <a:p>
+            <a:pPr marL="171450" lvl="0" indent="-171450">
+              <a:buFont typeface="Arial" charset="0"/>
+              <a:buChar char="•"/>
+            </a:pPr>
+            <a:r>
+              <a:rPr lang="de-DE" sz="1200" kern="1200" dirty="0" smtClean="0">
+                <a:solidFill>
+                  <a:schemeClr val="tx1"/>
+                </a:solidFill>
+                <a:effectLst/>
+                <a:latin typeface="+mn-lt"/>
+                <a:ea typeface="+mn-ea"/>
+                <a:cs typeface="+mn-cs"/>
+              </a:rPr>
+              <a:t>Frühlingsbeginn Wetter sehr wechselhaft</a:t>
+            </a:r>
+            <a:endParaRPr lang="en-GB" sz="1200" kern="1200" dirty="0" smtClean="0">
+              <a:solidFill>
+                <a:schemeClr val="tx1"/>
+              </a:solidFill>
+              <a:effectLst/>
+              <a:latin typeface="+mn-lt"/>
+              <a:ea typeface="+mn-ea"/>
+              <a:cs typeface="+mn-cs"/>
+            </a:endParaRPr>
+          </a:p>
+          <a:p>
+            <a:pPr marL="171450" lvl="0" indent="-171450">
+              <a:buFont typeface="Arial" charset="0"/>
+              <a:buChar char="•"/>
+            </a:pPr>
+            <a:r>
+              <a:rPr lang="de-DE" sz="1200" kern="1200" dirty="0" smtClean="0">
+                <a:solidFill>
+                  <a:schemeClr val="tx1"/>
+                </a:solidFill>
+                <a:effectLst/>
+                <a:latin typeface="+mn-lt"/>
+                <a:ea typeface="+mn-ea"/>
+                <a:cs typeface="+mn-cs"/>
+              </a:rPr>
+              <a:t>Hab mir Frage gestellt wie viele Sonnenstunden der Tag an einen bestimmten Standort hatte</a:t>
+            </a:r>
+            <a:endParaRPr lang="en-GB" sz="1200" kern="1200" dirty="0" smtClean="0">
+              <a:solidFill>
+                <a:schemeClr val="tx1"/>
+              </a:solidFill>
+              <a:effectLst/>
+              <a:latin typeface="+mn-lt"/>
+              <a:ea typeface="+mn-ea"/>
+              <a:cs typeface="+mn-cs"/>
+            </a:endParaRPr>
+          </a:p>
+          <a:p>
+            <a:pPr marL="171450" lvl="0" indent="-171450">
+              <a:buFont typeface="Arial" charset="0"/>
+              <a:buChar char="•"/>
+            </a:pPr>
+            <a:r>
+              <a:rPr lang="de-DE" sz="1200" kern="1200" dirty="0" smtClean="0">
+                <a:solidFill>
+                  <a:schemeClr val="tx1"/>
+                </a:solidFill>
+                <a:effectLst/>
+                <a:latin typeface="+mn-lt"/>
+                <a:ea typeface="+mn-ea"/>
+                <a:cs typeface="+mn-cs"/>
+              </a:rPr>
+              <a:t>Verschiedene Anwendungsbereiche: Landwirtschaft </a:t>
+            </a:r>
+            <a:r>
+              <a:rPr lang="de-DE" sz="1200" kern="1200" dirty="0" smtClean="0">
+                <a:solidFill>
+                  <a:schemeClr val="tx1"/>
+                </a:solidFill>
+                <a:effectLst/>
+                <a:latin typeface="+mn-lt"/>
+                <a:ea typeface="+mn-ea"/>
+                <a:cs typeface="+mn-cs"/>
+                <a:sym typeface="Wingdings" charset="2"/>
+              </a:rPr>
+              <a:t></a:t>
+            </a:r>
+            <a:r>
+              <a:rPr lang="de-DE" sz="1200" kern="1200" dirty="0" smtClean="0">
+                <a:solidFill>
+                  <a:schemeClr val="tx1"/>
+                </a:solidFill>
+                <a:effectLst/>
+                <a:latin typeface="+mn-lt"/>
+                <a:ea typeface="+mn-ea"/>
+                <a:cs typeface="+mn-cs"/>
+              </a:rPr>
+              <a:t> Optimierung Pflanzzeiten</a:t>
+            </a:r>
+            <a:endParaRPr lang="en-GB" sz="1200" kern="1200" dirty="0" smtClean="0">
+              <a:solidFill>
+                <a:schemeClr val="tx1"/>
+              </a:solidFill>
+              <a:effectLst/>
+              <a:latin typeface="+mn-lt"/>
+              <a:ea typeface="+mn-ea"/>
+              <a:cs typeface="+mn-cs"/>
+            </a:endParaRPr>
+          </a:p>
+          <a:p>
+            <a:pPr marL="171450" lvl="0" indent="-171450">
+              <a:buFont typeface="Arial" charset="0"/>
+              <a:buChar char="•"/>
+            </a:pPr>
+            <a:r>
+              <a:rPr lang="de-DE" sz="1200" kern="1200" dirty="0" smtClean="0">
+                <a:solidFill>
+                  <a:schemeClr val="tx1"/>
+                </a:solidFill>
+                <a:effectLst/>
+                <a:latin typeface="+mn-lt"/>
+                <a:ea typeface="+mn-ea"/>
+                <a:cs typeface="+mn-cs"/>
+              </a:rPr>
+              <a:t>Medizin </a:t>
+            </a:r>
+            <a:r>
+              <a:rPr lang="de-DE" sz="1200" kern="1200" dirty="0" smtClean="0">
+                <a:solidFill>
+                  <a:schemeClr val="tx1"/>
+                </a:solidFill>
+                <a:effectLst/>
+                <a:latin typeface="+mn-lt"/>
+                <a:ea typeface="+mn-ea"/>
+                <a:cs typeface="+mn-cs"/>
+                <a:sym typeface="Wingdings" charset="2"/>
+              </a:rPr>
+              <a:t></a:t>
+            </a:r>
+            <a:r>
+              <a:rPr lang="de-DE" sz="1200" kern="1200" dirty="0" smtClean="0">
+                <a:solidFill>
+                  <a:schemeClr val="tx1"/>
+                </a:solidFill>
+                <a:effectLst/>
+                <a:latin typeface="+mn-lt"/>
+                <a:ea typeface="+mn-ea"/>
+                <a:cs typeface="+mn-cs"/>
+              </a:rPr>
+              <a:t> Vitamin D</a:t>
+            </a:r>
+          </a:p>
+          <a:p>
+            <a:pPr marL="171450" lvl="0" indent="-171450">
+              <a:buFont typeface="Arial" charset="0"/>
+              <a:buChar char="•"/>
+            </a:pPr>
+            <a:endParaRPr lang="en-GB" sz="1200" kern="1200" dirty="0" smtClean="0">
+              <a:solidFill>
+                <a:schemeClr val="tx1"/>
+              </a:solidFill>
+              <a:effectLst/>
+              <a:latin typeface="+mn-lt"/>
+              <a:ea typeface="+mn-ea"/>
+              <a:cs typeface="+mn-cs"/>
+            </a:endParaRPr>
+          </a:p>
+          <a:p>
+            <a:r>
+              <a:rPr lang="de-DE" sz="1200" kern="1200" dirty="0" smtClean="0">
+                <a:solidFill>
+                  <a:schemeClr val="tx1"/>
+                </a:solidFill>
+                <a:effectLst/>
+                <a:latin typeface="+mn-lt"/>
+                <a:ea typeface="+mn-ea"/>
+                <a:cs typeface="+mn-cs"/>
+              </a:rPr>
+              <a:t>Ursprüngliche Idee:</a:t>
+            </a:r>
+            <a:endParaRPr lang="en-GB" sz="1200" kern="1200" dirty="0" smtClean="0">
+              <a:solidFill>
+                <a:schemeClr val="tx1"/>
+              </a:solidFill>
+              <a:effectLst/>
+              <a:latin typeface="+mn-lt"/>
+              <a:ea typeface="+mn-ea"/>
+              <a:cs typeface="+mn-cs"/>
+            </a:endParaRPr>
+          </a:p>
+          <a:p>
+            <a:r>
+              <a:rPr lang="de-DE" sz="1200" kern="1200" dirty="0" smtClean="0">
+                <a:solidFill>
+                  <a:schemeClr val="tx1"/>
+                </a:solidFill>
+                <a:effectLst/>
+                <a:latin typeface="+mn-lt"/>
+                <a:ea typeface="+mn-ea"/>
+                <a:cs typeface="+mn-cs"/>
+              </a:rPr>
+              <a:t>Erfassung der exakten Sonnenstunden an mehreren Standorten, zum Vergleich der Daten</a:t>
+            </a:r>
+            <a:endParaRPr lang="en-GB" sz="1200" kern="1200" dirty="0" smtClean="0">
+              <a:solidFill>
+                <a:schemeClr val="tx1"/>
+              </a:solidFill>
+              <a:effectLst/>
+              <a:latin typeface="+mn-lt"/>
+              <a:ea typeface="+mn-ea"/>
+              <a:cs typeface="+mn-cs"/>
+            </a:endParaRPr>
+          </a:p>
+          <a:p>
+            <a:r>
+              <a:rPr lang="de-DE" sz="1200" kern="1200" dirty="0" smtClean="0">
+                <a:solidFill>
+                  <a:schemeClr val="tx1"/>
+                </a:solidFill>
+                <a:effectLst/>
+                <a:latin typeface="+mn-lt"/>
+                <a:ea typeface="+mn-ea"/>
+                <a:cs typeface="+mn-cs"/>
+              </a:rPr>
+              <a:t>Dazu Erfassung verschiedener Helligkeitszustände: Sonne, Wolken mit verminderter Wolkendichte, Wolken mit verstärkter Wolkendichte, Dunkel</a:t>
+            </a:r>
+            <a:endParaRPr lang="en-GB" sz="1200" kern="1200" dirty="0" smtClean="0">
+              <a:solidFill>
+                <a:schemeClr val="tx1"/>
+              </a:solidFill>
+              <a:effectLst/>
+              <a:latin typeface="+mn-lt"/>
+              <a:ea typeface="+mn-ea"/>
+              <a:cs typeface="+mn-cs"/>
+            </a:endParaRPr>
+          </a:p>
+          <a:p>
+            <a:r>
+              <a:rPr lang="de-DE" sz="1200" kern="1200" dirty="0" smtClean="0">
+                <a:solidFill>
+                  <a:schemeClr val="tx1"/>
+                </a:solidFill>
+                <a:effectLst/>
+                <a:latin typeface="+mn-lt"/>
+                <a:ea typeface="+mn-ea"/>
+                <a:cs typeface="+mn-cs"/>
+              </a:rPr>
+              <a:t>Kombiniert man diese mit nun mit der jeweiligen Zeitdauer könnte man die Sonnenstunden berechnen.</a:t>
+            </a:r>
+          </a:p>
+          <a:p>
+            <a:endParaRPr lang="en-GB" sz="1200" kern="1200" dirty="0" smtClean="0">
+              <a:solidFill>
+                <a:schemeClr val="tx1"/>
+              </a:solidFill>
+              <a:effectLst/>
+              <a:latin typeface="+mn-lt"/>
+              <a:ea typeface="+mn-ea"/>
+              <a:cs typeface="+mn-cs"/>
+            </a:endParaRPr>
+          </a:p>
+          <a:p>
+            <a:r>
+              <a:rPr lang="de-DE" sz="1200" kern="1200" dirty="0" smtClean="0">
+                <a:solidFill>
+                  <a:schemeClr val="tx1"/>
+                </a:solidFill>
+                <a:effectLst/>
+                <a:latin typeface="+mn-lt"/>
+                <a:ea typeface="+mn-ea"/>
+                <a:cs typeface="+mn-cs"/>
+              </a:rPr>
+              <a:t>Um diese Aufgabe zu bewerkstelligen trugen wir alle benötigten Formeln zusammen</a:t>
+            </a:r>
+            <a:endParaRPr lang="en-GB" sz="1200" kern="1200" dirty="0" smtClean="0">
+              <a:solidFill>
+                <a:schemeClr val="tx1"/>
+              </a:solidFill>
+              <a:effectLst/>
+              <a:latin typeface="+mn-lt"/>
+              <a:ea typeface="+mn-ea"/>
+              <a:cs typeface="+mn-cs"/>
+            </a:endParaRPr>
+          </a:p>
+          <a:p>
+            <a:r>
+              <a:rPr lang="de-DE" sz="1200" kern="1200" dirty="0" smtClean="0">
+                <a:solidFill>
+                  <a:schemeClr val="tx1"/>
+                </a:solidFill>
+                <a:effectLst/>
+                <a:latin typeface="+mn-lt"/>
+                <a:ea typeface="+mn-ea"/>
+                <a:cs typeface="+mn-cs"/>
+              </a:rPr>
+              <a:t>Jedoch gaben die von uns gewählten Messgeräte keine Auskunft über physikalischen Einheiten </a:t>
+            </a:r>
+            <a:r>
+              <a:rPr lang="de-DE" sz="1200" kern="1200" dirty="0" smtClean="0">
+                <a:solidFill>
+                  <a:schemeClr val="tx1"/>
+                </a:solidFill>
+                <a:effectLst/>
+                <a:latin typeface="+mn-lt"/>
+                <a:ea typeface="+mn-ea"/>
+                <a:cs typeface="+mn-cs"/>
+                <a:sym typeface="Wingdings" charset="2"/>
+              </a:rPr>
+              <a:t></a:t>
+            </a:r>
+            <a:r>
+              <a:rPr lang="de-DE" sz="1200" kern="1200" dirty="0" smtClean="0">
+                <a:solidFill>
+                  <a:schemeClr val="tx1"/>
+                </a:solidFill>
+                <a:effectLst/>
+                <a:latin typeface="+mn-lt"/>
+                <a:ea typeface="+mn-ea"/>
+                <a:cs typeface="+mn-cs"/>
+              </a:rPr>
+              <a:t> LUX</a:t>
+            </a:r>
+          </a:p>
+          <a:p>
+            <a:endParaRPr lang="en-GB" sz="1200" kern="1200" dirty="0" smtClean="0">
+              <a:solidFill>
+                <a:schemeClr val="tx1"/>
+              </a:solidFill>
+              <a:effectLst/>
+              <a:latin typeface="+mn-lt"/>
+              <a:ea typeface="+mn-ea"/>
+              <a:cs typeface="+mn-cs"/>
+            </a:endParaRPr>
+          </a:p>
+          <a:p>
+            <a:r>
+              <a:rPr lang="de-DE" sz="1200" kern="1200" dirty="0" smtClean="0">
+                <a:solidFill>
+                  <a:schemeClr val="tx1"/>
+                </a:solidFill>
+                <a:effectLst/>
+                <a:latin typeface="+mn-lt"/>
+                <a:ea typeface="+mn-ea"/>
+                <a:cs typeface="+mn-cs"/>
+              </a:rPr>
+              <a:t>Die hier für die Berechnung mit den Formeln benötigt werden</a:t>
+            </a:r>
+            <a:endParaRPr lang="en-GB" sz="1200" kern="1200" dirty="0" smtClean="0">
+              <a:solidFill>
+                <a:schemeClr val="tx1"/>
+              </a:solidFill>
+              <a:effectLst/>
+              <a:latin typeface="+mn-lt"/>
+              <a:ea typeface="+mn-ea"/>
+              <a:cs typeface="+mn-cs"/>
+            </a:endParaRPr>
+          </a:p>
+          <a:p>
+            <a:r>
+              <a:rPr lang="de-DE" sz="1200" kern="1200" dirty="0" smtClean="0">
+                <a:solidFill>
+                  <a:schemeClr val="tx1"/>
+                </a:solidFill>
+                <a:effectLst/>
+                <a:latin typeface="+mn-lt"/>
+                <a:ea typeface="+mn-ea"/>
+                <a:cs typeface="+mn-cs"/>
+              </a:rPr>
+              <a:t>Messung der Helligkeitswerte mit Hilfe eines Photowiderstandes, eines Kondensators und des </a:t>
+            </a:r>
+            <a:r>
+              <a:rPr lang="de-DE" sz="1200" kern="1200" dirty="0" err="1" smtClean="0">
+                <a:solidFill>
+                  <a:schemeClr val="tx1"/>
+                </a:solidFill>
+                <a:effectLst/>
+                <a:latin typeface="+mn-lt"/>
+                <a:ea typeface="+mn-ea"/>
+                <a:cs typeface="+mn-cs"/>
+              </a:rPr>
+              <a:t>Raspberry</a:t>
+            </a:r>
+            <a:r>
+              <a:rPr lang="de-DE" sz="1200" kern="1200" dirty="0" smtClean="0">
+                <a:solidFill>
+                  <a:schemeClr val="tx1"/>
+                </a:solidFill>
+                <a:effectLst/>
+                <a:latin typeface="+mn-lt"/>
+                <a:ea typeface="+mn-ea"/>
+                <a:cs typeface="+mn-cs"/>
+              </a:rPr>
+              <a:t> </a:t>
+            </a:r>
+            <a:r>
+              <a:rPr lang="de-DE" sz="1200" kern="1200" dirty="0" err="1" smtClean="0">
+                <a:solidFill>
+                  <a:schemeClr val="tx1"/>
+                </a:solidFill>
+                <a:effectLst/>
+                <a:latin typeface="+mn-lt"/>
+                <a:ea typeface="+mn-ea"/>
+                <a:cs typeface="+mn-cs"/>
+              </a:rPr>
+              <a:t>Pi‘s</a:t>
+            </a:r>
+            <a:endParaRPr lang="de-DE" sz="1200" kern="1200" dirty="0" smtClean="0">
+              <a:solidFill>
+                <a:schemeClr val="tx1"/>
+              </a:solidFill>
+              <a:effectLst/>
+              <a:latin typeface="+mn-lt"/>
+              <a:ea typeface="+mn-ea"/>
+              <a:cs typeface="+mn-cs"/>
+            </a:endParaRPr>
+          </a:p>
+          <a:p>
+            <a:endParaRPr lang="en-GB" sz="1200" kern="1200" dirty="0" smtClean="0">
+              <a:solidFill>
+                <a:schemeClr val="tx1"/>
+              </a:solidFill>
+              <a:effectLst/>
+              <a:latin typeface="+mn-lt"/>
+              <a:ea typeface="+mn-ea"/>
+              <a:cs typeface="+mn-cs"/>
+            </a:endParaRPr>
+          </a:p>
+          <a:p>
+            <a:r>
+              <a:rPr lang="de-DE" sz="1200" kern="1200" dirty="0" smtClean="0">
+                <a:solidFill>
+                  <a:schemeClr val="tx1"/>
+                </a:solidFill>
+                <a:effectLst/>
+                <a:latin typeface="+mn-lt"/>
+                <a:ea typeface="+mn-ea"/>
+                <a:cs typeface="+mn-cs"/>
+              </a:rPr>
+              <a:t>Es wird die Dauer gemessen die der Kondensator braucht um aufzuladen</a:t>
+            </a:r>
+            <a:endParaRPr lang="en-GB" sz="1200" kern="1200" dirty="0" smtClean="0">
+              <a:solidFill>
+                <a:schemeClr val="tx1"/>
+              </a:solidFill>
+              <a:effectLst/>
+              <a:latin typeface="+mn-lt"/>
+              <a:ea typeface="+mn-ea"/>
+              <a:cs typeface="+mn-cs"/>
+            </a:endParaRPr>
+          </a:p>
+          <a:p>
+            <a:r>
+              <a:rPr lang="de-DE" sz="1200" kern="1200" dirty="0" smtClean="0">
+                <a:solidFill>
+                  <a:schemeClr val="tx1"/>
+                </a:solidFill>
+                <a:effectLst/>
+                <a:latin typeface="+mn-lt"/>
+                <a:ea typeface="+mn-ea"/>
+                <a:cs typeface="+mn-cs"/>
+              </a:rPr>
+              <a:t>Diese Zeit kann benutzt werden um Rückschlüsse über die derzeitige Helligkeit zu liefern</a:t>
+            </a:r>
+            <a:endParaRPr lang="en-GB" sz="1200" kern="1200" dirty="0" smtClean="0">
+              <a:solidFill>
+                <a:schemeClr val="tx1"/>
+              </a:solidFill>
+              <a:effectLst/>
+              <a:latin typeface="+mn-lt"/>
+              <a:ea typeface="+mn-ea"/>
+              <a:cs typeface="+mn-cs"/>
+            </a:endParaRPr>
+          </a:p>
+          <a:p>
+            <a:r>
+              <a:rPr lang="de-DE" sz="1200" kern="1200" dirty="0" smtClean="0">
+                <a:solidFill>
+                  <a:schemeClr val="tx1"/>
+                </a:solidFill>
+                <a:effectLst/>
+                <a:latin typeface="+mn-lt"/>
+                <a:ea typeface="+mn-ea"/>
+                <a:cs typeface="+mn-cs"/>
+              </a:rPr>
+              <a:t>Aufgrund der ungenauen Messergebnisse verwarfen wir unsere ursprüngliche Idee</a:t>
+            </a:r>
+          </a:p>
+          <a:p>
+            <a:endParaRPr lang="en-GB" sz="1200" kern="1200" dirty="0" smtClean="0">
+              <a:solidFill>
+                <a:schemeClr val="tx1"/>
+              </a:solidFill>
+              <a:effectLst/>
+              <a:latin typeface="+mn-lt"/>
+              <a:ea typeface="+mn-ea"/>
+              <a:cs typeface="+mn-cs"/>
+            </a:endParaRPr>
+          </a:p>
+          <a:p>
+            <a:r>
+              <a:rPr lang="de-DE" sz="1200" kern="1200" dirty="0" smtClean="0">
+                <a:solidFill>
+                  <a:schemeClr val="tx1"/>
+                </a:solidFill>
+                <a:effectLst/>
+                <a:latin typeface="+mn-lt"/>
+                <a:ea typeface="+mn-ea"/>
+                <a:cs typeface="+mn-cs"/>
+              </a:rPr>
+              <a:t>Umgesetzt wurde:</a:t>
+            </a:r>
+            <a:endParaRPr lang="en-GB" sz="1200" kern="1200" dirty="0" smtClean="0">
+              <a:solidFill>
+                <a:schemeClr val="tx1"/>
+              </a:solidFill>
+              <a:effectLst/>
+              <a:latin typeface="+mn-lt"/>
+              <a:ea typeface="+mn-ea"/>
+              <a:cs typeface="+mn-cs"/>
+            </a:endParaRPr>
+          </a:p>
+          <a:p>
+            <a:r>
+              <a:rPr lang="de-DE" sz="1200" kern="1200" dirty="0" smtClean="0">
+                <a:solidFill>
+                  <a:schemeClr val="tx1"/>
+                </a:solidFill>
+                <a:effectLst/>
+                <a:latin typeface="+mn-lt"/>
+                <a:ea typeface="+mn-ea"/>
+                <a:cs typeface="+mn-cs"/>
+              </a:rPr>
+              <a:t>Programm im Server-Client Verbund</a:t>
+            </a:r>
+            <a:endParaRPr lang="en-GB" sz="1200" kern="1200" dirty="0" smtClean="0">
+              <a:solidFill>
+                <a:schemeClr val="tx1"/>
+              </a:solidFill>
+              <a:effectLst/>
+              <a:latin typeface="+mn-lt"/>
+              <a:ea typeface="+mn-ea"/>
+              <a:cs typeface="+mn-cs"/>
+            </a:endParaRPr>
+          </a:p>
+          <a:p>
+            <a:r>
+              <a:rPr lang="de-DE" sz="1200" kern="1200" dirty="0" smtClean="0">
+                <a:solidFill>
+                  <a:schemeClr val="tx1"/>
+                </a:solidFill>
+                <a:effectLst/>
+                <a:latin typeface="+mn-lt"/>
+                <a:ea typeface="+mn-ea"/>
+                <a:cs typeface="+mn-cs"/>
+              </a:rPr>
+              <a:t>Client misst Lichtintensität im 5 Sekunden Intervall</a:t>
+            </a:r>
+            <a:endParaRPr lang="en-GB" sz="1200" kern="1200" dirty="0" smtClean="0">
+              <a:solidFill>
+                <a:schemeClr val="tx1"/>
+              </a:solidFill>
+              <a:effectLst/>
+              <a:latin typeface="+mn-lt"/>
+              <a:ea typeface="+mn-ea"/>
+              <a:cs typeface="+mn-cs"/>
+            </a:endParaRPr>
+          </a:p>
+          <a:p>
+            <a:r>
+              <a:rPr lang="de-DE" sz="1200" kern="1200" dirty="0" smtClean="0">
+                <a:solidFill>
+                  <a:schemeClr val="tx1"/>
+                </a:solidFill>
+                <a:effectLst/>
+                <a:latin typeface="+mn-lt"/>
+                <a:ea typeface="+mn-ea"/>
+                <a:cs typeface="+mn-cs"/>
+              </a:rPr>
+              <a:t>Schickt Daten alle 5 Minuten zum Server</a:t>
+            </a:r>
+          </a:p>
+          <a:p>
+            <a:endParaRPr lang="en-GB" sz="1200" kern="1200" dirty="0" smtClean="0">
+              <a:solidFill>
+                <a:schemeClr val="tx1"/>
+              </a:solidFill>
+              <a:effectLst/>
+              <a:latin typeface="+mn-lt"/>
+              <a:ea typeface="+mn-ea"/>
+              <a:cs typeface="+mn-cs"/>
+            </a:endParaRPr>
+          </a:p>
+          <a:p>
+            <a:r>
+              <a:rPr lang="de-DE" sz="1200" kern="1200" dirty="0" smtClean="0">
+                <a:solidFill>
+                  <a:schemeClr val="tx1"/>
+                </a:solidFill>
+                <a:effectLst/>
+                <a:latin typeface="+mn-lt"/>
+                <a:ea typeface="+mn-ea"/>
+                <a:cs typeface="+mn-cs"/>
+              </a:rPr>
+              <a:t>Da wir nur Werte gebrauchen können die gemessen werden währen die Sonne scheint </a:t>
+            </a:r>
+            <a:r>
+              <a:rPr lang="de-DE" sz="1200" kern="1200" dirty="0" smtClean="0">
+                <a:solidFill>
+                  <a:schemeClr val="tx1"/>
+                </a:solidFill>
+                <a:effectLst/>
+                <a:latin typeface="+mn-lt"/>
+                <a:ea typeface="+mn-ea"/>
+                <a:cs typeface="+mn-cs"/>
+                <a:sym typeface="Wingdings" charset="2"/>
+              </a:rPr>
+              <a:t></a:t>
+            </a:r>
+            <a:r>
+              <a:rPr lang="de-DE" sz="1200" kern="1200" dirty="0" smtClean="0">
+                <a:solidFill>
+                  <a:schemeClr val="tx1"/>
+                </a:solidFill>
+                <a:effectLst/>
+                <a:latin typeface="+mn-lt"/>
+                <a:ea typeface="+mn-ea"/>
+                <a:cs typeface="+mn-cs"/>
+              </a:rPr>
+              <a:t> Steffen erläutern</a:t>
+            </a:r>
+            <a:endParaRPr lang="en-GB" sz="1200" kern="1200" dirty="0" smtClean="0">
+              <a:solidFill>
+                <a:schemeClr val="tx1"/>
+              </a:solidFill>
+              <a:effectLst/>
+              <a:latin typeface="+mn-lt"/>
+              <a:ea typeface="+mn-ea"/>
+              <a:cs typeface="+mn-cs"/>
+            </a:endParaRPr>
+          </a:p>
+          <a:p>
+            <a:r>
+              <a:rPr lang="de-DE" sz="1200" kern="1200" dirty="0" smtClean="0">
+                <a:solidFill>
+                  <a:schemeClr val="tx1"/>
+                </a:solidFill>
+                <a:effectLst/>
+                <a:latin typeface="+mn-lt"/>
+                <a:ea typeface="+mn-ea"/>
+                <a:cs typeface="+mn-cs"/>
+              </a:rPr>
+              <a:t>Formel gefunden die anhand des Standortes die Sonnenaufgangs- sowie Sonnenuntergangszeit zu berechnet</a:t>
+            </a:r>
+            <a:endParaRPr lang="en-GB" sz="1200" kern="1200" dirty="0" smtClean="0">
+              <a:solidFill>
+                <a:schemeClr val="tx1"/>
+              </a:solidFill>
+              <a:effectLst/>
+              <a:latin typeface="+mn-lt"/>
+              <a:ea typeface="+mn-ea"/>
+              <a:cs typeface="+mn-cs"/>
+            </a:endParaRPr>
+          </a:p>
+          <a:p>
+            <a:endParaRPr lang="de-DE" dirty="0"/>
+          </a:p>
+        </p:txBody>
+      </p:sp>
+      <p:sp>
+        <p:nvSpPr>
+          <p:cNvPr id="4" name="Slide Number Placeholder 3"/>
+          <p:cNvSpPr>
+            <a:spLocks noGrp="1"/>
+          </p:cNvSpPr>
+          <p:nvPr>
+            <p:ph type="sldNum" sz="quarter" idx="10"/>
+          </p:nvPr>
+        </p:nvSpPr>
+        <p:spPr/>
+        <p:txBody>
+          <a:bodyPr/>
+          <a:lstStyle/>
+          <a:p>
+            <a:fld id="{FF15405E-4AB1-1C4A-8F75-D830CB03AB8E}" type="slidenum">
+              <a:rPr lang="de-DE" smtClean="0"/>
+              <a:t>3</a:t>
+            </a:fld>
+            <a:endParaRPr lang="de-DE"/>
+          </a:p>
+        </p:txBody>
+      </p:sp>
+    </p:spTree>
+    <p:extLst>
+      <p:ext uri="{BB962C8B-B14F-4D97-AF65-F5344CB8AC3E}">
+        <p14:creationId xmlns:p14="http://schemas.microsoft.com/office/powerpoint/2010/main" val="280545688"/>
+      </p:ext>
+    </p:extLst>
+  </p:cSld>
+  <p:clrMapOvr>
+    <a:masterClrMapping/>
+  </p:clrMapOvr>
+</p:notes>
+</file>
+
+<file path=ppt/notesSlides/notesSlide3.xml><?xml version="1.0" encoding="utf-8"?>
+<p:notes xmlns:a="http://schemas.openxmlformats.org/drawingml/2006/main" xmlns:r="http://schemas.openxmlformats.org/officeDocument/2006/relationships" xmlns:p="http://schemas.openxmlformats.org/presentationml/2006/main">
+  <p:cSld>
+    <p:spTree>
+      <p:nvGrpSpPr>
+        <p:cNvPr id="1" name=""/>
+        <p:cNvGrpSpPr/>
+        <p:nvPr/>
+      </p:nvGrpSpPr>
+      <p:grpSpPr>
+        <a:xfrm>
+          <a:off x="0" y="0"/>
+          <a:ext cx="0" cy="0"/>
+          <a:chOff x="0" y="0"/>
+          <a:chExt cx="0" cy="0"/>
+        </a:xfrm>
+      </p:grpSpPr>
+      <p:sp>
+        <p:nvSpPr>
+          <p:cNvPr id="2" name="Slide Image Placeholder 1"/>
+          <p:cNvSpPr>
+            <a:spLocks noGrp="1" noRot="1" noChangeAspect="1"/>
+          </p:cNvSpPr>
+          <p:nvPr>
+            <p:ph type="sldImg"/>
+          </p:nvPr>
+        </p:nvSpPr>
+        <p:spPr/>
+      </p:sp>
+      <p:sp>
+        <p:nvSpPr>
+          <p:cNvPr id="3" name="Notes Placeholder 2"/>
+          <p:cNvSpPr>
+            <a:spLocks noGrp="1"/>
+          </p:cNvSpPr>
+          <p:nvPr>
+            <p:ph type="body" idx="1"/>
+          </p:nvPr>
+        </p:nvSpPr>
+        <p:spPr/>
+        <p:txBody>
+          <a:bodyPr/>
+          <a:lstStyle/>
+          <a:p>
+            <a:pPr marL="171450" lvl="0" indent="-171450">
+              <a:buFont typeface="Arial" charset="0"/>
+              <a:buChar char="•"/>
+            </a:pPr>
+            <a:r>
+              <a:rPr lang="de-DE" sz="1200" kern="1200" dirty="0" smtClean="0">
+                <a:solidFill>
+                  <a:schemeClr val="tx1"/>
+                </a:solidFill>
+                <a:effectLst/>
+                <a:latin typeface="+mn-lt"/>
+                <a:ea typeface="+mn-ea"/>
+                <a:cs typeface="+mn-cs"/>
+              </a:rPr>
+              <a:t>Einführung Samuel</a:t>
+            </a:r>
+            <a:endParaRPr lang="en-GB" sz="1200" kern="1200" dirty="0" smtClean="0">
+              <a:solidFill>
+                <a:schemeClr val="tx1"/>
+              </a:solidFill>
+              <a:effectLst/>
+              <a:latin typeface="+mn-lt"/>
+              <a:ea typeface="+mn-ea"/>
+              <a:cs typeface="+mn-cs"/>
+            </a:endParaRPr>
+          </a:p>
+          <a:p>
+            <a:pPr marL="171450" lvl="0" indent="-171450">
+              <a:buFont typeface="Arial" charset="0"/>
+              <a:buChar char="•"/>
+            </a:pPr>
+            <a:r>
+              <a:rPr lang="de-DE" sz="1200" kern="1200" dirty="0" smtClean="0">
+                <a:solidFill>
+                  <a:schemeClr val="tx1"/>
+                </a:solidFill>
+                <a:effectLst/>
+                <a:latin typeface="+mn-lt"/>
+                <a:ea typeface="+mn-ea"/>
+                <a:cs typeface="+mn-cs"/>
+              </a:rPr>
+              <a:t>Begrüßung</a:t>
+            </a:r>
+            <a:endParaRPr lang="en-GB" sz="1200" kern="1200" dirty="0" smtClean="0">
+              <a:solidFill>
+                <a:schemeClr val="tx1"/>
+              </a:solidFill>
+              <a:effectLst/>
+              <a:latin typeface="+mn-lt"/>
+              <a:ea typeface="+mn-ea"/>
+              <a:cs typeface="+mn-cs"/>
+            </a:endParaRPr>
+          </a:p>
+          <a:p>
+            <a:pPr marL="171450" lvl="0" indent="-171450">
+              <a:buFont typeface="Arial" charset="0"/>
+              <a:buChar char="•"/>
+            </a:pPr>
+            <a:r>
+              <a:rPr lang="de-DE" sz="1200" kern="1200" dirty="0" smtClean="0">
+                <a:solidFill>
+                  <a:schemeClr val="tx1"/>
+                </a:solidFill>
+                <a:effectLst/>
+                <a:latin typeface="+mn-lt"/>
+                <a:ea typeface="+mn-ea"/>
+                <a:cs typeface="+mn-cs"/>
+              </a:rPr>
+              <a:t>Frühlingsbeginn Wetter sehr wechselhaft</a:t>
+            </a:r>
+            <a:endParaRPr lang="en-GB" sz="1200" kern="1200" dirty="0" smtClean="0">
+              <a:solidFill>
+                <a:schemeClr val="tx1"/>
+              </a:solidFill>
+              <a:effectLst/>
+              <a:latin typeface="+mn-lt"/>
+              <a:ea typeface="+mn-ea"/>
+              <a:cs typeface="+mn-cs"/>
+            </a:endParaRPr>
+          </a:p>
+          <a:p>
+            <a:pPr marL="171450" lvl="0" indent="-171450">
+              <a:buFont typeface="Arial" charset="0"/>
+              <a:buChar char="•"/>
+            </a:pPr>
+            <a:r>
+              <a:rPr lang="de-DE" sz="1200" kern="1200" dirty="0" smtClean="0">
+                <a:solidFill>
+                  <a:schemeClr val="tx1"/>
+                </a:solidFill>
+                <a:effectLst/>
+                <a:latin typeface="+mn-lt"/>
+                <a:ea typeface="+mn-ea"/>
+                <a:cs typeface="+mn-cs"/>
+              </a:rPr>
+              <a:t>Hab mir Frage gestellt wie viele Sonnenstunden der Tag an einen bestimmten Standort hatte</a:t>
+            </a:r>
+            <a:endParaRPr lang="en-GB" sz="1200" kern="1200" dirty="0" smtClean="0">
+              <a:solidFill>
+                <a:schemeClr val="tx1"/>
+              </a:solidFill>
+              <a:effectLst/>
+              <a:latin typeface="+mn-lt"/>
+              <a:ea typeface="+mn-ea"/>
+              <a:cs typeface="+mn-cs"/>
+            </a:endParaRPr>
+          </a:p>
+          <a:p>
+            <a:pPr marL="171450" lvl="0" indent="-171450">
+              <a:buFont typeface="Arial" charset="0"/>
+              <a:buChar char="•"/>
+            </a:pPr>
+            <a:r>
+              <a:rPr lang="de-DE" sz="1200" kern="1200" dirty="0" smtClean="0">
+                <a:solidFill>
+                  <a:schemeClr val="tx1"/>
+                </a:solidFill>
+                <a:effectLst/>
+                <a:latin typeface="+mn-lt"/>
+                <a:ea typeface="+mn-ea"/>
+                <a:cs typeface="+mn-cs"/>
+              </a:rPr>
+              <a:t>Verschiedene Anwendungsbereiche: Landwirtschaft </a:t>
+            </a:r>
+            <a:r>
+              <a:rPr lang="de-DE" sz="1200" kern="1200" dirty="0" smtClean="0">
+                <a:solidFill>
+                  <a:schemeClr val="tx1"/>
+                </a:solidFill>
+                <a:effectLst/>
+                <a:latin typeface="+mn-lt"/>
+                <a:ea typeface="+mn-ea"/>
+                <a:cs typeface="+mn-cs"/>
+                <a:sym typeface="Wingdings" charset="2"/>
+              </a:rPr>
+              <a:t></a:t>
+            </a:r>
+            <a:r>
+              <a:rPr lang="de-DE" sz="1200" kern="1200" dirty="0" smtClean="0">
+                <a:solidFill>
+                  <a:schemeClr val="tx1"/>
+                </a:solidFill>
+                <a:effectLst/>
+                <a:latin typeface="+mn-lt"/>
+                <a:ea typeface="+mn-ea"/>
+                <a:cs typeface="+mn-cs"/>
+              </a:rPr>
+              <a:t> Optimierung Pflanzzeiten</a:t>
+            </a:r>
+            <a:endParaRPr lang="en-GB" sz="1200" kern="1200" dirty="0" smtClean="0">
+              <a:solidFill>
+                <a:schemeClr val="tx1"/>
+              </a:solidFill>
+              <a:effectLst/>
+              <a:latin typeface="+mn-lt"/>
+              <a:ea typeface="+mn-ea"/>
+              <a:cs typeface="+mn-cs"/>
+            </a:endParaRPr>
+          </a:p>
+          <a:p>
+            <a:pPr marL="171450" lvl="0" indent="-171450">
+              <a:buFont typeface="Arial" charset="0"/>
+              <a:buChar char="•"/>
+            </a:pPr>
+            <a:r>
+              <a:rPr lang="de-DE" sz="1200" kern="1200" dirty="0" smtClean="0">
+                <a:solidFill>
+                  <a:schemeClr val="tx1"/>
+                </a:solidFill>
+                <a:effectLst/>
+                <a:latin typeface="+mn-lt"/>
+                <a:ea typeface="+mn-ea"/>
+                <a:cs typeface="+mn-cs"/>
+              </a:rPr>
+              <a:t>Medizin </a:t>
+            </a:r>
+            <a:r>
+              <a:rPr lang="de-DE" sz="1200" kern="1200" dirty="0" smtClean="0">
+                <a:solidFill>
+                  <a:schemeClr val="tx1"/>
+                </a:solidFill>
+                <a:effectLst/>
+                <a:latin typeface="+mn-lt"/>
+                <a:ea typeface="+mn-ea"/>
+                <a:cs typeface="+mn-cs"/>
+                <a:sym typeface="Wingdings" charset="2"/>
+              </a:rPr>
+              <a:t></a:t>
+            </a:r>
+            <a:r>
+              <a:rPr lang="de-DE" sz="1200" kern="1200" dirty="0" smtClean="0">
+                <a:solidFill>
+                  <a:schemeClr val="tx1"/>
+                </a:solidFill>
+                <a:effectLst/>
+                <a:latin typeface="+mn-lt"/>
+                <a:ea typeface="+mn-ea"/>
+                <a:cs typeface="+mn-cs"/>
+              </a:rPr>
+              <a:t> Vitamin D</a:t>
+            </a:r>
+          </a:p>
+          <a:p>
+            <a:pPr marL="171450" lvl="0" indent="-171450">
+              <a:buFont typeface="Arial" charset="0"/>
+              <a:buChar char="•"/>
+            </a:pPr>
+            <a:endParaRPr lang="en-GB" sz="1200" kern="1200" dirty="0" smtClean="0">
+              <a:solidFill>
+                <a:schemeClr val="tx1"/>
+              </a:solidFill>
+              <a:effectLst/>
+              <a:latin typeface="+mn-lt"/>
+              <a:ea typeface="+mn-ea"/>
+              <a:cs typeface="+mn-cs"/>
+            </a:endParaRPr>
+          </a:p>
+          <a:p>
+            <a:r>
+              <a:rPr lang="de-DE" sz="1200" kern="1200" dirty="0" smtClean="0">
+                <a:solidFill>
+                  <a:schemeClr val="tx1"/>
+                </a:solidFill>
+                <a:effectLst/>
+                <a:latin typeface="+mn-lt"/>
+                <a:ea typeface="+mn-ea"/>
+                <a:cs typeface="+mn-cs"/>
+              </a:rPr>
+              <a:t>Ursprüngliche Idee:</a:t>
+            </a:r>
+            <a:endParaRPr lang="en-GB" sz="1200" kern="1200" dirty="0" smtClean="0">
+              <a:solidFill>
+                <a:schemeClr val="tx1"/>
+              </a:solidFill>
+              <a:effectLst/>
+              <a:latin typeface="+mn-lt"/>
+              <a:ea typeface="+mn-ea"/>
+              <a:cs typeface="+mn-cs"/>
+            </a:endParaRPr>
+          </a:p>
+          <a:p>
+            <a:r>
+              <a:rPr lang="de-DE" sz="1200" kern="1200" dirty="0" smtClean="0">
+                <a:solidFill>
+                  <a:schemeClr val="tx1"/>
+                </a:solidFill>
+                <a:effectLst/>
+                <a:latin typeface="+mn-lt"/>
+                <a:ea typeface="+mn-ea"/>
+                <a:cs typeface="+mn-cs"/>
+              </a:rPr>
+              <a:t>Erfassung der exakten Sonnenstunden an mehreren Standorten, zum Vergleich der Daten</a:t>
+            </a:r>
+            <a:endParaRPr lang="en-GB" sz="1200" kern="1200" dirty="0" smtClean="0">
+              <a:solidFill>
+                <a:schemeClr val="tx1"/>
+              </a:solidFill>
+              <a:effectLst/>
+              <a:latin typeface="+mn-lt"/>
+              <a:ea typeface="+mn-ea"/>
+              <a:cs typeface="+mn-cs"/>
+            </a:endParaRPr>
+          </a:p>
+          <a:p>
+            <a:r>
+              <a:rPr lang="de-DE" sz="1200" kern="1200" dirty="0" smtClean="0">
+                <a:solidFill>
+                  <a:schemeClr val="tx1"/>
+                </a:solidFill>
+                <a:effectLst/>
+                <a:latin typeface="+mn-lt"/>
+                <a:ea typeface="+mn-ea"/>
+                <a:cs typeface="+mn-cs"/>
+              </a:rPr>
+              <a:t>Dazu Erfassung verschiedener Helligkeitszustände: Sonne, Wolken mit verminderter Wolkendichte, Wolken mit verstärkter Wolkendichte, Dunkel</a:t>
+            </a:r>
+            <a:endParaRPr lang="en-GB" sz="1200" kern="1200" dirty="0" smtClean="0">
+              <a:solidFill>
+                <a:schemeClr val="tx1"/>
+              </a:solidFill>
+              <a:effectLst/>
+              <a:latin typeface="+mn-lt"/>
+              <a:ea typeface="+mn-ea"/>
+              <a:cs typeface="+mn-cs"/>
+            </a:endParaRPr>
+          </a:p>
+          <a:p>
+            <a:r>
+              <a:rPr lang="de-DE" sz="1200" kern="1200" dirty="0" smtClean="0">
+                <a:solidFill>
+                  <a:schemeClr val="tx1"/>
+                </a:solidFill>
+                <a:effectLst/>
+                <a:latin typeface="+mn-lt"/>
+                <a:ea typeface="+mn-ea"/>
+                <a:cs typeface="+mn-cs"/>
+              </a:rPr>
+              <a:t>Kombiniert man diese mit nun mit der jeweiligen Zeitdauer könnte man die Sonnenstunden berechnen.</a:t>
+            </a:r>
+          </a:p>
+          <a:p>
+            <a:endParaRPr lang="en-GB" sz="1200" kern="1200" dirty="0" smtClean="0">
+              <a:solidFill>
+                <a:schemeClr val="tx1"/>
+              </a:solidFill>
+              <a:effectLst/>
+              <a:latin typeface="+mn-lt"/>
+              <a:ea typeface="+mn-ea"/>
+              <a:cs typeface="+mn-cs"/>
+            </a:endParaRPr>
+          </a:p>
+          <a:p>
+            <a:r>
+              <a:rPr lang="de-DE" sz="1200" kern="1200" dirty="0" smtClean="0">
+                <a:solidFill>
+                  <a:schemeClr val="tx1"/>
+                </a:solidFill>
+                <a:effectLst/>
+                <a:latin typeface="+mn-lt"/>
+                <a:ea typeface="+mn-ea"/>
+                <a:cs typeface="+mn-cs"/>
+              </a:rPr>
+              <a:t>Um diese Aufgabe zu bewerkstelligen trugen wir alle benötigten Formeln zusammen</a:t>
+            </a:r>
+            <a:endParaRPr lang="en-GB" sz="1200" kern="1200" dirty="0" smtClean="0">
+              <a:solidFill>
+                <a:schemeClr val="tx1"/>
+              </a:solidFill>
+              <a:effectLst/>
+              <a:latin typeface="+mn-lt"/>
+              <a:ea typeface="+mn-ea"/>
+              <a:cs typeface="+mn-cs"/>
+            </a:endParaRPr>
+          </a:p>
+          <a:p>
+            <a:r>
+              <a:rPr lang="de-DE" sz="1200" kern="1200" dirty="0" smtClean="0">
+                <a:solidFill>
+                  <a:schemeClr val="tx1"/>
+                </a:solidFill>
+                <a:effectLst/>
+                <a:latin typeface="+mn-lt"/>
+                <a:ea typeface="+mn-ea"/>
+                <a:cs typeface="+mn-cs"/>
+              </a:rPr>
+              <a:t>Jedoch gaben die von uns gewählten Messgeräte keine Auskunft über physikalischen Einheiten </a:t>
+            </a:r>
+            <a:r>
+              <a:rPr lang="de-DE" sz="1200" kern="1200" dirty="0" smtClean="0">
+                <a:solidFill>
+                  <a:schemeClr val="tx1"/>
+                </a:solidFill>
+                <a:effectLst/>
+                <a:latin typeface="+mn-lt"/>
+                <a:ea typeface="+mn-ea"/>
+                <a:cs typeface="+mn-cs"/>
+                <a:sym typeface="Wingdings" charset="2"/>
+              </a:rPr>
+              <a:t></a:t>
+            </a:r>
+            <a:r>
+              <a:rPr lang="de-DE" sz="1200" kern="1200" dirty="0" smtClean="0">
+                <a:solidFill>
+                  <a:schemeClr val="tx1"/>
+                </a:solidFill>
+                <a:effectLst/>
+                <a:latin typeface="+mn-lt"/>
+                <a:ea typeface="+mn-ea"/>
+                <a:cs typeface="+mn-cs"/>
+              </a:rPr>
+              <a:t> LUX</a:t>
+            </a:r>
+          </a:p>
+          <a:p>
+            <a:endParaRPr lang="en-GB" sz="1200" kern="1200" dirty="0" smtClean="0">
+              <a:solidFill>
+                <a:schemeClr val="tx1"/>
+              </a:solidFill>
+              <a:effectLst/>
+              <a:latin typeface="+mn-lt"/>
+              <a:ea typeface="+mn-ea"/>
+              <a:cs typeface="+mn-cs"/>
+            </a:endParaRPr>
+          </a:p>
+          <a:p>
+            <a:r>
+              <a:rPr lang="de-DE" sz="1200" kern="1200" dirty="0" smtClean="0">
+                <a:solidFill>
+                  <a:schemeClr val="tx1"/>
+                </a:solidFill>
+                <a:effectLst/>
+                <a:latin typeface="+mn-lt"/>
+                <a:ea typeface="+mn-ea"/>
+                <a:cs typeface="+mn-cs"/>
+              </a:rPr>
+              <a:t>Die hier für die Berechnung mit den Formeln benötigt werden</a:t>
+            </a:r>
+            <a:endParaRPr lang="en-GB" sz="1200" kern="1200" dirty="0" smtClean="0">
+              <a:solidFill>
+                <a:schemeClr val="tx1"/>
+              </a:solidFill>
+              <a:effectLst/>
+              <a:latin typeface="+mn-lt"/>
+              <a:ea typeface="+mn-ea"/>
+              <a:cs typeface="+mn-cs"/>
+            </a:endParaRPr>
+          </a:p>
+          <a:p>
+            <a:r>
+              <a:rPr lang="de-DE" sz="1200" kern="1200" dirty="0" smtClean="0">
+                <a:solidFill>
+                  <a:schemeClr val="tx1"/>
+                </a:solidFill>
+                <a:effectLst/>
+                <a:latin typeface="+mn-lt"/>
+                <a:ea typeface="+mn-ea"/>
+                <a:cs typeface="+mn-cs"/>
+              </a:rPr>
+              <a:t>Messung der Helligkeitswerte mit Hilfe eines Photowiderstandes, eines Kondensators und des </a:t>
+            </a:r>
+            <a:r>
+              <a:rPr lang="de-DE" sz="1200" kern="1200" dirty="0" err="1" smtClean="0">
+                <a:solidFill>
+                  <a:schemeClr val="tx1"/>
+                </a:solidFill>
+                <a:effectLst/>
+                <a:latin typeface="+mn-lt"/>
+                <a:ea typeface="+mn-ea"/>
+                <a:cs typeface="+mn-cs"/>
+              </a:rPr>
+              <a:t>Raspberry</a:t>
+            </a:r>
+            <a:r>
+              <a:rPr lang="de-DE" sz="1200" kern="1200" dirty="0" smtClean="0">
+                <a:solidFill>
+                  <a:schemeClr val="tx1"/>
+                </a:solidFill>
+                <a:effectLst/>
+                <a:latin typeface="+mn-lt"/>
+                <a:ea typeface="+mn-ea"/>
+                <a:cs typeface="+mn-cs"/>
+              </a:rPr>
+              <a:t> </a:t>
+            </a:r>
+            <a:r>
+              <a:rPr lang="de-DE" sz="1200" kern="1200" dirty="0" err="1" smtClean="0">
+                <a:solidFill>
+                  <a:schemeClr val="tx1"/>
+                </a:solidFill>
+                <a:effectLst/>
+                <a:latin typeface="+mn-lt"/>
+                <a:ea typeface="+mn-ea"/>
+                <a:cs typeface="+mn-cs"/>
+              </a:rPr>
+              <a:t>Pi‘s</a:t>
+            </a:r>
+            <a:endParaRPr lang="de-DE" sz="1200" kern="1200" dirty="0" smtClean="0">
+              <a:solidFill>
+                <a:schemeClr val="tx1"/>
+              </a:solidFill>
+              <a:effectLst/>
+              <a:latin typeface="+mn-lt"/>
+              <a:ea typeface="+mn-ea"/>
+              <a:cs typeface="+mn-cs"/>
+            </a:endParaRPr>
+          </a:p>
+          <a:p>
+            <a:endParaRPr lang="en-GB" sz="1200" kern="1200" dirty="0" smtClean="0">
+              <a:solidFill>
+                <a:schemeClr val="tx1"/>
+              </a:solidFill>
+              <a:effectLst/>
+              <a:latin typeface="+mn-lt"/>
+              <a:ea typeface="+mn-ea"/>
+              <a:cs typeface="+mn-cs"/>
+            </a:endParaRPr>
+          </a:p>
+          <a:p>
+            <a:r>
+              <a:rPr lang="de-DE" sz="1200" kern="1200" dirty="0" smtClean="0">
+                <a:solidFill>
+                  <a:schemeClr val="tx1"/>
+                </a:solidFill>
+                <a:effectLst/>
+                <a:latin typeface="+mn-lt"/>
+                <a:ea typeface="+mn-ea"/>
+                <a:cs typeface="+mn-cs"/>
+              </a:rPr>
+              <a:t>Es wird die Dauer gemessen die der Kondensator braucht um aufzuladen</a:t>
+            </a:r>
+            <a:endParaRPr lang="en-GB" sz="1200" kern="1200" dirty="0" smtClean="0">
+              <a:solidFill>
+                <a:schemeClr val="tx1"/>
+              </a:solidFill>
+              <a:effectLst/>
+              <a:latin typeface="+mn-lt"/>
+              <a:ea typeface="+mn-ea"/>
+              <a:cs typeface="+mn-cs"/>
+            </a:endParaRPr>
+          </a:p>
+          <a:p>
+            <a:r>
+              <a:rPr lang="de-DE" sz="1200" kern="1200" dirty="0" smtClean="0">
+                <a:solidFill>
+                  <a:schemeClr val="tx1"/>
+                </a:solidFill>
+                <a:effectLst/>
+                <a:latin typeface="+mn-lt"/>
+                <a:ea typeface="+mn-ea"/>
+                <a:cs typeface="+mn-cs"/>
+              </a:rPr>
+              <a:t>Diese Zeit kann benutzt werden um Rückschlüsse über die derzeitige Helligkeit zu liefern</a:t>
+            </a:r>
+            <a:endParaRPr lang="en-GB" sz="1200" kern="1200" dirty="0" smtClean="0">
+              <a:solidFill>
+                <a:schemeClr val="tx1"/>
+              </a:solidFill>
+              <a:effectLst/>
+              <a:latin typeface="+mn-lt"/>
+              <a:ea typeface="+mn-ea"/>
+              <a:cs typeface="+mn-cs"/>
+            </a:endParaRPr>
+          </a:p>
+          <a:p>
+            <a:r>
+              <a:rPr lang="de-DE" sz="1200" kern="1200" dirty="0" smtClean="0">
+                <a:solidFill>
+                  <a:schemeClr val="tx1"/>
+                </a:solidFill>
+                <a:effectLst/>
+                <a:latin typeface="+mn-lt"/>
+                <a:ea typeface="+mn-ea"/>
+                <a:cs typeface="+mn-cs"/>
+              </a:rPr>
+              <a:t>Aufgrund der ungenauen Messergebnisse verwarfen wir unsere ursprüngliche Idee</a:t>
+            </a:r>
+          </a:p>
+          <a:p>
+            <a:endParaRPr lang="en-GB" sz="1200" kern="1200" dirty="0" smtClean="0">
+              <a:solidFill>
+                <a:schemeClr val="tx1"/>
+              </a:solidFill>
+              <a:effectLst/>
+              <a:latin typeface="+mn-lt"/>
+              <a:ea typeface="+mn-ea"/>
+              <a:cs typeface="+mn-cs"/>
+            </a:endParaRPr>
+          </a:p>
+          <a:p>
+            <a:r>
+              <a:rPr lang="de-DE" sz="1200" kern="1200" dirty="0" smtClean="0">
+                <a:solidFill>
+                  <a:schemeClr val="tx1"/>
+                </a:solidFill>
+                <a:effectLst/>
+                <a:latin typeface="+mn-lt"/>
+                <a:ea typeface="+mn-ea"/>
+                <a:cs typeface="+mn-cs"/>
+              </a:rPr>
+              <a:t>Umgesetzt wurde:</a:t>
+            </a:r>
+            <a:endParaRPr lang="en-GB" sz="1200" kern="1200" dirty="0" smtClean="0">
+              <a:solidFill>
+                <a:schemeClr val="tx1"/>
+              </a:solidFill>
+              <a:effectLst/>
+              <a:latin typeface="+mn-lt"/>
+              <a:ea typeface="+mn-ea"/>
+              <a:cs typeface="+mn-cs"/>
+            </a:endParaRPr>
+          </a:p>
+          <a:p>
+            <a:r>
+              <a:rPr lang="de-DE" sz="1200" kern="1200" dirty="0" smtClean="0">
+                <a:solidFill>
+                  <a:schemeClr val="tx1"/>
+                </a:solidFill>
+                <a:effectLst/>
+                <a:latin typeface="+mn-lt"/>
+                <a:ea typeface="+mn-ea"/>
+                <a:cs typeface="+mn-cs"/>
+              </a:rPr>
+              <a:t>Programm im Server-Client Verbund</a:t>
+            </a:r>
+            <a:endParaRPr lang="en-GB" sz="1200" kern="1200" dirty="0" smtClean="0">
+              <a:solidFill>
+                <a:schemeClr val="tx1"/>
+              </a:solidFill>
+              <a:effectLst/>
+              <a:latin typeface="+mn-lt"/>
+              <a:ea typeface="+mn-ea"/>
+              <a:cs typeface="+mn-cs"/>
+            </a:endParaRPr>
+          </a:p>
+          <a:p>
+            <a:r>
+              <a:rPr lang="de-DE" sz="1200" kern="1200" dirty="0" smtClean="0">
+                <a:solidFill>
+                  <a:schemeClr val="tx1"/>
+                </a:solidFill>
+                <a:effectLst/>
+                <a:latin typeface="+mn-lt"/>
+                <a:ea typeface="+mn-ea"/>
+                <a:cs typeface="+mn-cs"/>
+              </a:rPr>
+              <a:t>Client misst Lichtintensität im 5 Sekunden Intervall</a:t>
+            </a:r>
+            <a:endParaRPr lang="en-GB" sz="1200" kern="1200" dirty="0" smtClean="0">
+              <a:solidFill>
+                <a:schemeClr val="tx1"/>
+              </a:solidFill>
+              <a:effectLst/>
+              <a:latin typeface="+mn-lt"/>
+              <a:ea typeface="+mn-ea"/>
+              <a:cs typeface="+mn-cs"/>
+            </a:endParaRPr>
+          </a:p>
+          <a:p>
+            <a:r>
+              <a:rPr lang="de-DE" sz="1200" kern="1200" dirty="0" smtClean="0">
+                <a:solidFill>
+                  <a:schemeClr val="tx1"/>
+                </a:solidFill>
+                <a:effectLst/>
+                <a:latin typeface="+mn-lt"/>
+                <a:ea typeface="+mn-ea"/>
+                <a:cs typeface="+mn-cs"/>
+              </a:rPr>
+              <a:t>Schickt Daten alle 5 Minuten zum Server</a:t>
+            </a:r>
+          </a:p>
+          <a:p>
+            <a:endParaRPr lang="en-GB" sz="1200" kern="1200" dirty="0" smtClean="0">
+              <a:solidFill>
+                <a:schemeClr val="tx1"/>
+              </a:solidFill>
+              <a:effectLst/>
+              <a:latin typeface="+mn-lt"/>
+              <a:ea typeface="+mn-ea"/>
+              <a:cs typeface="+mn-cs"/>
+            </a:endParaRPr>
+          </a:p>
+          <a:p>
+            <a:r>
+              <a:rPr lang="de-DE" sz="1200" kern="1200" dirty="0" smtClean="0">
+                <a:solidFill>
+                  <a:schemeClr val="tx1"/>
+                </a:solidFill>
+                <a:effectLst/>
+                <a:latin typeface="+mn-lt"/>
+                <a:ea typeface="+mn-ea"/>
+                <a:cs typeface="+mn-cs"/>
+              </a:rPr>
+              <a:t>Da wir nur Werte gebrauchen können die gemessen werden währen die Sonne scheint </a:t>
+            </a:r>
+            <a:r>
+              <a:rPr lang="de-DE" sz="1200" kern="1200" dirty="0" smtClean="0">
+                <a:solidFill>
+                  <a:schemeClr val="tx1"/>
+                </a:solidFill>
+                <a:effectLst/>
+                <a:latin typeface="+mn-lt"/>
+                <a:ea typeface="+mn-ea"/>
+                <a:cs typeface="+mn-cs"/>
+                <a:sym typeface="Wingdings" charset="2"/>
+              </a:rPr>
+              <a:t></a:t>
+            </a:r>
+            <a:r>
+              <a:rPr lang="de-DE" sz="1200" kern="1200" dirty="0" smtClean="0">
+                <a:solidFill>
+                  <a:schemeClr val="tx1"/>
+                </a:solidFill>
+                <a:effectLst/>
+                <a:latin typeface="+mn-lt"/>
+                <a:ea typeface="+mn-ea"/>
+                <a:cs typeface="+mn-cs"/>
+              </a:rPr>
+              <a:t> Steffen erläutern</a:t>
+            </a:r>
+            <a:endParaRPr lang="en-GB" sz="1200" kern="1200" dirty="0" smtClean="0">
+              <a:solidFill>
+                <a:schemeClr val="tx1"/>
+              </a:solidFill>
+              <a:effectLst/>
+              <a:latin typeface="+mn-lt"/>
+              <a:ea typeface="+mn-ea"/>
+              <a:cs typeface="+mn-cs"/>
+            </a:endParaRPr>
+          </a:p>
+          <a:p>
+            <a:r>
+              <a:rPr lang="de-DE" sz="1200" kern="1200" dirty="0" smtClean="0">
+                <a:solidFill>
+                  <a:schemeClr val="tx1"/>
+                </a:solidFill>
+                <a:effectLst/>
+                <a:latin typeface="+mn-lt"/>
+                <a:ea typeface="+mn-ea"/>
+                <a:cs typeface="+mn-cs"/>
+              </a:rPr>
+              <a:t>Formel gefunden die anhand des Standortes die Sonnenaufgangs- sowie Sonnenuntergangszeit zu berechnet</a:t>
+            </a:r>
+            <a:endParaRPr lang="en-GB" sz="1200" kern="1200" dirty="0" smtClean="0">
+              <a:solidFill>
+                <a:schemeClr val="tx1"/>
+              </a:solidFill>
+              <a:effectLst/>
+              <a:latin typeface="+mn-lt"/>
+              <a:ea typeface="+mn-ea"/>
+              <a:cs typeface="+mn-cs"/>
+            </a:endParaRPr>
+          </a:p>
+          <a:p>
+            <a:endParaRPr lang="de-DE" dirty="0"/>
+          </a:p>
+        </p:txBody>
+      </p:sp>
+      <p:sp>
+        <p:nvSpPr>
+          <p:cNvPr id="4" name="Slide Number Placeholder 3"/>
+          <p:cNvSpPr>
+            <a:spLocks noGrp="1"/>
+          </p:cNvSpPr>
+          <p:nvPr>
+            <p:ph type="sldNum" sz="quarter" idx="10"/>
+          </p:nvPr>
+        </p:nvSpPr>
+        <p:spPr/>
+        <p:txBody>
+          <a:bodyPr/>
+          <a:lstStyle/>
+          <a:p>
+            <a:fld id="{FF15405E-4AB1-1C4A-8F75-D830CB03AB8E}" type="slidenum">
+              <a:rPr lang="de-DE" smtClean="0"/>
+              <a:t>4</a:t>
+            </a:fld>
+            <a:endParaRPr lang="de-DE"/>
+          </a:p>
+        </p:txBody>
+      </p:sp>
+    </p:spTree>
+    <p:extLst>
+      <p:ext uri="{BB962C8B-B14F-4D97-AF65-F5344CB8AC3E}">
+        <p14:creationId xmlns:p14="http://schemas.microsoft.com/office/powerpoint/2010/main" val="1404773051"/>
+      </p:ext>
+    </p:extLst>
+  </p:cSld>
+  <p:clrMapOvr>
+    <a:masterClrMapping/>
+  </p:clrMapOvr>
+</p:notes>
+</file>
+
+<file path=ppt/notesSlides/notesSlide4.xml><?xml version="1.0" encoding="utf-8"?>
+<p:notes xmlns:a="http://schemas.openxmlformats.org/drawingml/2006/main" xmlns:r="http://schemas.openxmlformats.org/officeDocument/2006/relationships" xmlns:p="http://schemas.openxmlformats.org/presentationml/2006/main">
+  <p:cSld>
+    <p:spTree>
+      <p:nvGrpSpPr>
+        <p:cNvPr id="1" name=""/>
+        <p:cNvGrpSpPr/>
+        <p:nvPr/>
+      </p:nvGrpSpPr>
+      <p:grpSpPr>
+        <a:xfrm>
+          <a:off x="0" y="0"/>
+          <a:ext cx="0" cy="0"/>
+          <a:chOff x="0" y="0"/>
+          <a:chExt cx="0" cy="0"/>
+        </a:xfrm>
+      </p:grpSpPr>
+      <p:sp>
+        <p:nvSpPr>
+          <p:cNvPr id="2" name="Slide Image Placeholder 1"/>
+          <p:cNvSpPr>
+            <a:spLocks noGrp="1" noRot="1" noChangeAspect="1"/>
+          </p:cNvSpPr>
+          <p:nvPr>
+            <p:ph type="sldImg"/>
+          </p:nvPr>
+        </p:nvSpPr>
+        <p:spPr/>
+      </p:sp>
+      <p:sp>
+        <p:nvSpPr>
+          <p:cNvPr id="3" name="Notes Placeholder 2"/>
+          <p:cNvSpPr>
+            <a:spLocks noGrp="1"/>
+          </p:cNvSpPr>
+          <p:nvPr>
+            <p:ph type="body" idx="1"/>
+          </p:nvPr>
+        </p:nvSpPr>
+        <p:spPr/>
+        <p:txBody>
+          <a:bodyPr/>
+          <a:lstStyle/>
+          <a:p>
+            <a:pPr marL="171450" lvl="0" indent="-171450">
+              <a:buFont typeface="Arial" charset="0"/>
+              <a:buChar char="•"/>
+            </a:pPr>
+            <a:r>
+              <a:rPr lang="de-DE" sz="1200" kern="1200" dirty="0" smtClean="0">
+                <a:solidFill>
+                  <a:schemeClr val="tx1"/>
+                </a:solidFill>
+                <a:effectLst/>
+                <a:latin typeface="+mn-lt"/>
+                <a:ea typeface="+mn-ea"/>
+                <a:cs typeface="+mn-cs"/>
+              </a:rPr>
+              <a:t>Einführung Samuel</a:t>
+            </a:r>
+            <a:endParaRPr lang="en-GB" sz="1200" kern="1200" dirty="0" smtClean="0">
+              <a:solidFill>
+                <a:schemeClr val="tx1"/>
+              </a:solidFill>
+              <a:effectLst/>
+              <a:latin typeface="+mn-lt"/>
+              <a:ea typeface="+mn-ea"/>
+              <a:cs typeface="+mn-cs"/>
+            </a:endParaRPr>
+          </a:p>
+          <a:p>
+            <a:pPr marL="171450" lvl="0" indent="-171450">
+              <a:buFont typeface="Arial" charset="0"/>
+              <a:buChar char="•"/>
+            </a:pPr>
+            <a:r>
+              <a:rPr lang="de-DE" sz="1200" kern="1200" dirty="0" smtClean="0">
+                <a:solidFill>
+                  <a:schemeClr val="tx1"/>
+                </a:solidFill>
+                <a:effectLst/>
+                <a:latin typeface="+mn-lt"/>
+                <a:ea typeface="+mn-ea"/>
+                <a:cs typeface="+mn-cs"/>
+              </a:rPr>
+              <a:t>Begrüßung</a:t>
+            </a:r>
+            <a:endParaRPr lang="en-GB" sz="1200" kern="1200" dirty="0" smtClean="0">
+              <a:solidFill>
+                <a:schemeClr val="tx1"/>
+              </a:solidFill>
+              <a:effectLst/>
+              <a:latin typeface="+mn-lt"/>
+              <a:ea typeface="+mn-ea"/>
+              <a:cs typeface="+mn-cs"/>
+            </a:endParaRPr>
+          </a:p>
+          <a:p>
+            <a:pPr marL="171450" lvl="0" indent="-171450">
+              <a:buFont typeface="Arial" charset="0"/>
+              <a:buChar char="•"/>
+            </a:pPr>
+            <a:r>
+              <a:rPr lang="de-DE" sz="1200" kern="1200" dirty="0" smtClean="0">
+                <a:solidFill>
+                  <a:schemeClr val="tx1"/>
+                </a:solidFill>
+                <a:effectLst/>
+                <a:latin typeface="+mn-lt"/>
+                <a:ea typeface="+mn-ea"/>
+                <a:cs typeface="+mn-cs"/>
+              </a:rPr>
+              <a:t>Frühlingsbeginn Wetter sehr wechselhaft</a:t>
+            </a:r>
+            <a:endParaRPr lang="en-GB" sz="1200" kern="1200" dirty="0" smtClean="0">
+              <a:solidFill>
+                <a:schemeClr val="tx1"/>
+              </a:solidFill>
+              <a:effectLst/>
+              <a:latin typeface="+mn-lt"/>
+              <a:ea typeface="+mn-ea"/>
+              <a:cs typeface="+mn-cs"/>
+            </a:endParaRPr>
+          </a:p>
+          <a:p>
+            <a:pPr marL="171450" lvl="0" indent="-171450">
+              <a:buFont typeface="Arial" charset="0"/>
+              <a:buChar char="•"/>
+            </a:pPr>
+            <a:r>
+              <a:rPr lang="de-DE" sz="1200" kern="1200" dirty="0" smtClean="0">
+                <a:solidFill>
+                  <a:schemeClr val="tx1"/>
+                </a:solidFill>
+                <a:effectLst/>
+                <a:latin typeface="+mn-lt"/>
+                <a:ea typeface="+mn-ea"/>
+                <a:cs typeface="+mn-cs"/>
+              </a:rPr>
+              <a:t>Hab mir Frage gestellt wie viele Sonnenstunden der Tag an einen bestimmten Standort hatte</a:t>
+            </a:r>
+            <a:endParaRPr lang="en-GB" sz="1200" kern="1200" dirty="0" smtClean="0">
+              <a:solidFill>
+                <a:schemeClr val="tx1"/>
+              </a:solidFill>
+              <a:effectLst/>
+              <a:latin typeface="+mn-lt"/>
+              <a:ea typeface="+mn-ea"/>
+              <a:cs typeface="+mn-cs"/>
+            </a:endParaRPr>
+          </a:p>
+          <a:p>
+            <a:pPr marL="171450" lvl="0" indent="-171450">
+              <a:buFont typeface="Arial" charset="0"/>
+              <a:buChar char="•"/>
+            </a:pPr>
+            <a:r>
+              <a:rPr lang="de-DE" sz="1200" kern="1200" dirty="0" smtClean="0">
+                <a:solidFill>
+                  <a:schemeClr val="tx1"/>
+                </a:solidFill>
+                <a:effectLst/>
+                <a:latin typeface="+mn-lt"/>
+                <a:ea typeface="+mn-ea"/>
+                <a:cs typeface="+mn-cs"/>
+              </a:rPr>
+              <a:t>Verschiedene Anwendungsbereiche: Landwirtschaft </a:t>
+            </a:r>
+            <a:r>
+              <a:rPr lang="de-DE" sz="1200" kern="1200" dirty="0" smtClean="0">
+                <a:solidFill>
+                  <a:schemeClr val="tx1"/>
+                </a:solidFill>
+                <a:effectLst/>
+                <a:latin typeface="+mn-lt"/>
+                <a:ea typeface="+mn-ea"/>
+                <a:cs typeface="+mn-cs"/>
+                <a:sym typeface="Wingdings" charset="2"/>
+              </a:rPr>
+              <a:t></a:t>
+            </a:r>
+            <a:r>
+              <a:rPr lang="de-DE" sz="1200" kern="1200" dirty="0" smtClean="0">
+                <a:solidFill>
+                  <a:schemeClr val="tx1"/>
+                </a:solidFill>
+                <a:effectLst/>
+                <a:latin typeface="+mn-lt"/>
+                <a:ea typeface="+mn-ea"/>
+                <a:cs typeface="+mn-cs"/>
+              </a:rPr>
+              <a:t> Optimierung Pflanzzeiten</a:t>
+            </a:r>
+            <a:endParaRPr lang="en-GB" sz="1200" kern="1200" dirty="0" smtClean="0">
+              <a:solidFill>
+                <a:schemeClr val="tx1"/>
+              </a:solidFill>
+              <a:effectLst/>
+              <a:latin typeface="+mn-lt"/>
+              <a:ea typeface="+mn-ea"/>
+              <a:cs typeface="+mn-cs"/>
+            </a:endParaRPr>
+          </a:p>
+          <a:p>
+            <a:pPr marL="171450" lvl="0" indent="-171450">
+              <a:buFont typeface="Arial" charset="0"/>
+              <a:buChar char="•"/>
+            </a:pPr>
+            <a:r>
+              <a:rPr lang="de-DE" sz="1200" kern="1200" dirty="0" smtClean="0">
+                <a:solidFill>
+                  <a:schemeClr val="tx1"/>
+                </a:solidFill>
+                <a:effectLst/>
+                <a:latin typeface="+mn-lt"/>
+                <a:ea typeface="+mn-ea"/>
+                <a:cs typeface="+mn-cs"/>
+              </a:rPr>
+              <a:t>Medizin </a:t>
+            </a:r>
+            <a:r>
+              <a:rPr lang="de-DE" sz="1200" kern="1200" dirty="0" smtClean="0">
+                <a:solidFill>
+                  <a:schemeClr val="tx1"/>
+                </a:solidFill>
+                <a:effectLst/>
+                <a:latin typeface="+mn-lt"/>
+                <a:ea typeface="+mn-ea"/>
+                <a:cs typeface="+mn-cs"/>
+                <a:sym typeface="Wingdings" charset="2"/>
+              </a:rPr>
+              <a:t></a:t>
+            </a:r>
+            <a:r>
+              <a:rPr lang="de-DE" sz="1200" kern="1200" dirty="0" smtClean="0">
+                <a:solidFill>
+                  <a:schemeClr val="tx1"/>
+                </a:solidFill>
+                <a:effectLst/>
+                <a:latin typeface="+mn-lt"/>
+                <a:ea typeface="+mn-ea"/>
+                <a:cs typeface="+mn-cs"/>
+              </a:rPr>
+              <a:t> Vitamin D</a:t>
+            </a:r>
+          </a:p>
+          <a:p>
+            <a:pPr marL="171450" lvl="0" indent="-171450">
+              <a:buFont typeface="Arial" charset="0"/>
+              <a:buChar char="•"/>
+            </a:pPr>
+            <a:endParaRPr lang="en-GB" sz="1200" kern="1200" dirty="0" smtClean="0">
+              <a:solidFill>
+                <a:schemeClr val="tx1"/>
+              </a:solidFill>
+              <a:effectLst/>
+              <a:latin typeface="+mn-lt"/>
+              <a:ea typeface="+mn-ea"/>
+              <a:cs typeface="+mn-cs"/>
+            </a:endParaRPr>
+          </a:p>
+          <a:p>
+            <a:r>
+              <a:rPr lang="de-DE" sz="1200" kern="1200" dirty="0" smtClean="0">
+                <a:solidFill>
+                  <a:schemeClr val="tx1"/>
+                </a:solidFill>
+                <a:effectLst/>
+                <a:latin typeface="+mn-lt"/>
+                <a:ea typeface="+mn-ea"/>
+                <a:cs typeface="+mn-cs"/>
+              </a:rPr>
+              <a:t>Ursprüngliche Idee:</a:t>
+            </a:r>
+            <a:endParaRPr lang="en-GB" sz="1200" kern="1200" dirty="0" smtClean="0">
+              <a:solidFill>
+                <a:schemeClr val="tx1"/>
+              </a:solidFill>
+              <a:effectLst/>
+              <a:latin typeface="+mn-lt"/>
+              <a:ea typeface="+mn-ea"/>
+              <a:cs typeface="+mn-cs"/>
+            </a:endParaRPr>
+          </a:p>
+          <a:p>
+            <a:r>
+              <a:rPr lang="de-DE" sz="1200" kern="1200" dirty="0" smtClean="0">
+                <a:solidFill>
+                  <a:schemeClr val="tx1"/>
+                </a:solidFill>
+                <a:effectLst/>
+                <a:latin typeface="+mn-lt"/>
+                <a:ea typeface="+mn-ea"/>
+                <a:cs typeface="+mn-cs"/>
+              </a:rPr>
+              <a:t>Erfassung der exakten Sonnenstunden an mehreren Standorten, zum Vergleich der Daten</a:t>
+            </a:r>
+            <a:endParaRPr lang="en-GB" sz="1200" kern="1200" dirty="0" smtClean="0">
+              <a:solidFill>
+                <a:schemeClr val="tx1"/>
+              </a:solidFill>
+              <a:effectLst/>
+              <a:latin typeface="+mn-lt"/>
+              <a:ea typeface="+mn-ea"/>
+              <a:cs typeface="+mn-cs"/>
+            </a:endParaRPr>
+          </a:p>
+          <a:p>
+            <a:r>
+              <a:rPr lang="de-DE" sz="1200" kern="1200" dirty="0" smtClean="0">
+                <a:solidFill>
+                  <a:schemeClr val="tx1"/>
+                </a:solidFill>
+                <a:effectLst/>
+                <a:latin typeface="+mn-lt"/>
+                <a:ea typeface="+mn-ea"/>
+                <a:cs typeface="+mn-cs"/>
+              </a:rPr>
+              <a:t>Dazu Erfassung verschiedener Helligkeitszustände: Sonne, Wolken mit verminderter Wolkendichte, Wolken mit verstärkter Wolkendichte, Dunkel</a:t>
+            </a:r>
+            <a:endParaRPr lang="en-GB" sz="1200" kern="1200" dirty="0" smtClean="0">
+              <a:solidFill>
+                <a:schemeClr val="tx1"/>
+              </a:solidFill>
+              <a:effectLst/>
+              <a:latin typeface="+mn-lt"/>
+              <a:ea typeface="+mn-ea"/>
+              <a:cs typeface="+mn-cs"/>
+            </a:endParaRPr>
+          </a:p>
+          <a:p>
+            <a:r>
+              <a:rPr lang="de-DE" sz="1200" kern="1200" dirty="0" smtClean="0">
+                <a:solidFill>
+                  <a:schemeClr val="tx1"/>
+                </a:solidFill>
+                <a:effectLst/>
+                <a:latin typeface="+mn-lt"/>
+                <a:ea typeface="+mn-ea"/>
+                <a:cs typeface="+mn-cs"/>
+              </a:rPr>
+              <a:t>Kombiniert man diese mit nun mit der jeweiligen Zeitdauer könnte man die Sonnenstunden berechnen.</a:t>
+            </a:r>
+          </a:p>
+          <a:p>
+            <a:endParaRPr lang="en-GB" sz="1200" kern="1200" dirty="0" smtClean="0">
+              <a:solidFill>
+                <a:schemeClr val="tx1"/>
+              </a:solidFill>
+              <a:effectLst/>
+              <a:latin typeface="+mn-lt"/>
+              <a:ea typeface="+mn-ea"/>
+              <a:cs typeface="+mn-cs"/>
+            </a:endParaRPr>
+          </a:p>
+          <a:p>
+            <a:r>
+              <a:rPr lang="de-DE" sz="1200" kern="1200" dirty="0" smtClean="0">
+                <a:solidFill>
+                  <a:schemeClr val="tx1"/>
+                </a:solidFill>
+                <a:effectLst/>
+                <a:latin typeface="+mn-lt"/>
+                <a:ea typeface="+mn-ea"/>
+                <a:cs typeface="+mn-cs"/>
+              </a:rPr>
+              <a:t>Um diese Aufgabe zu bewerkstelligen trugen wir alle benötigten Formeln zusammen</a:t>
+            </a:r>
+            <a:endParaRPr lang="en-GB" sz="1200" kern="1200" dirty="0" smtClean="0">
+              <a:solidFill>
+                <a:schemeClr val="tx1"/>
+              </a:solidFill>
+              <a:effectLst/>
+              <a:latin typeface="+mn-lt"/>
+              <a:ea typeface="+mn-ea"/>
+              <a:cs typeface="+mn-cs"/>
+            </a:endParaRPr>
+          </a:p>
+          <a:p>
+            <a:r>
+              <a:rPr lang="de-DE" sz="1200" kern="1200" dirty="0" smtClean="0">
+                <a:solidFill>
+                  <a:schemeClr val="tx1"/>
+                </a:solidFill>
+                <a:effectLst/>
+                <a:latin typeface="+mn-lt"/>
+                <a:ea typeface="+mn-ea"/>
+                <a:cs typeface="+mn-cs"/>
+              </a:rPr>
+              <a:t>Jedoch gaben die von uns gewählten Messgeräte keine Auskunft über physikalischen Einheiten </a:t>
+            </a:r>
+            <a:r>
+              <a:rPr lang="de-DE" sz="1200" kern="1200" dirty="0" smtClean="0">
+                <a:solidFill>
+                  <a:schemeClr val="tx1"/>
+                </a:solidFill>
+                <a:effectLst/>
+                <a:latin typeface="+mn-lt"/>
+                <a:ea typeface="+mn-ea"/>
+                <a:cs typeface="+mn-cs"/>
+                <a:sym typeface="Wingdings" charset="2"/>
+              </a:rPr>
+              <a:t></a:t>
+            </a:r>
+            <a:r>
+              <a:rPr lang="de-DE" sz="1200" kern="1200" dirty="0" smtClean="0">
+                <a:solidFill>
+                  <a:schemeClr val="tx1"/>
+                </a:solidFill>
+                <a:effectLst/>
+                <a:latin typeface="+mn-lt"/>
+                <a:ea typeface="+mn-ea"/>
+                <a:cs typeface="+mn-cs"/>
+              </a:rPr>
+              <a:t> LUX</a:t>
+            </a:r>
+          </a:p>
+          <a:p>
+            <a:endParaRPr lang="en-GB" sz="1200" kern="1200" dirty="0" smtClean="0">
+              <a:solidFill>
+                <a:schemeClr val="tx1"/>
+              </a:solidFill>
+              <a:effectLst/>
+              <a:latin typeface="+mn-lt"/>
+              <a:ea typeface="+mn-ea"/>
+              <a:cs typeface="+mn-cs"/>
+            </a:endParaRPr>
+          </a:p>
+          <a:p>
+            <a:r>
+              <a:rPr lang="de-DE" sz="1200" kern="1200" dirty="0" smtClean="0">
+                <a:solidFill>
+                  <a:schemeClr val="tx1"/>
+                </a:solidFill>
+                <a:effectLst/>
+                <a:latin typeface="+mn-lt"/>
+                <a:ea typeface="+mn-ea"/>
+                <a:cs typeface="+mn-cs"/>
+              </a:rPr>
+              <a:t>Die hier für die Berechnung mit den Formeln benötigt werden</a:t>
+            </a:r>
+            <a:endParaRPr lang="en-GB" sz="1200" kern="1200" dirty="0" smtClean="0">
+              <a:solidFill>
+                <a:schemeClr val="tx1"/>
+              </a:solidFill>
+              <a:effectLst/>
+              <a:latin typeface="+mn-lt"/>
+              <a:ea typeface="+mn-ea"/>
+              <a:cs typeface="+mn-cs"/>
+            </a:endParaRPr>
+          </a:p>
+          <a:p>
+            <a:r>
+              <a:rPr lang="de-DE" sz="1200" kern="1200" dirty="0" smtClean="0">
+                <a:solidFill>
+                  <a:schemeClr val="tx1"/>
+                </a:solidFill>
+                <a:effectLst/>
+                <a:latin typeface="+mn-lt"/>
+                <a:ea typeface="+mn-ea"/>
+                <a:cs typeface="+mn-cs"/>
+              </a:rPr>
+              <a:t>Messung der Helligkeitswerte mit Hilfe eines Photowiderstandes, eines Kondensators und des </a:t>
+            </a:r>
+            <a:r>
+              <a:rPr lang="de-DE" sz="1200" kern="1200" dirty="0" err="1" smtClean="0">
+                <a:solidFill>
+                  <a:schemeClr val="tx1"/>
+                </a:solidFill>
+                <a:effectLst/>
+                <a:latin typeface="+mn-lt"/>
+                <a:ea typeface="+mn-ea"/>
+                <a:cs typeface="+mn-cs"/>
+              </a:rPr>
+              <a:t>Raspberry</a:t>
+            </a:r>
+            <a:r>
+              <a:rPr lang="de-DE" sz="1200" kern="1200" dirty="0" smtClean="0">
+                <a:solidFill>
+                  <a:schemeClr val="tx1"/>
+                </a:solidFill>
+                <a:effectLst/>
+                <a:latin typeface="+mn-lt"/>
+                <a:ea typeface="+mn-ea"/>
+                <a:cs typeface="+mn-cs"/>
+              </a:rPr>
+              <a:t> </a:t>
+            </a:r>
+            <a:r>
+              <a:rPr lang="de-DE" sz="1200" kern="1200" dirty="0" err="1" smtClean="0">
+                <a:solidFill>
+                  <a:schemeClr val="tx1"/>
+                </a:solidFill>
+                <a:effectLst/>
+                <a:latin typeface="+mn-lt"/>
+                <a:ea typeface="+mn-ea"/>
+                <a:cs typeface="+mn-cs"/>
+              </a:rPr>
+              <a:t>Pi‘s</a:t>
+            </a:r>
+            <a:endParaRPr lang="de-DE" sz="1200" kern="1200" dirty="0" smtClean="0">
+              <a:solidFill>
+                <a:schemeClr val="tx1"/>
+              </a:solidFill>
+              <a:effectLst/>
+              <a:latin typeface="+mn-lt"/>
+              <a:ea typeface="+mn-ea"/>
+              <a:cs typeface="+mn-cs"/>
+            </a:endParaRPr>
+          </a:p>
+          <a:p>
+            <a:endParaRPr lang="en-GB" sz="1200" kern="1200" dirty="0" smtClean="0">
+              <a:solidFill>
+                <a:schemeClr val="tx1"/>
+              </a:solidFill>
+              <a:effectLst/>
+              <a:latin typeface="+mn-lt"/>
+              <a:ea typeface="+mn-ea"/>
+              <a:cs typeface="+mn-cs"/>
+            </a:endParaRPr>
+          </a:p>
+          <a:p>
+            <a:r>
+              <a:rPr lang="de-DE" sz="1200" kern="1200" dirty="0" smtClean="0">
+                <a:solidFill>
+                  <a:schemeClr val="tx1"/>
+                </a:solidFill>
+                <a:effectLst/>
+                <a:latin typeface="+mn-lt"/>
+                <a:ea typeface="+mn-ea"/>
+                <a:cs typeface="+mn-cs"/>
+              </a:rPr>
+              <a:t>Es wird die Dauer gemessen die der Kondensator braucht um aufzuladen</a:t>
+            </a:r>
+            <a:endParaRPr lang="en-GB" sz="1200" kern="1200" dirty="0" smtClean="0">
+              <a:solidFill>
+                <a:schemeClr val="tx1"/>
+              </a:solidFill>
+              <a:effectLst/>
+              <a:latin typeface="+mn-lt"/>
+              <a:ea typeface="+mn-ea"/>
+              <a:cs typeface="+mn-cs"/>
+            </a:endParaRPr>
+          </a:p>
+          <a:p>
+            <a:r>
+              <a:rPr lang="de-DE" sz="1200" kern="1200" dirty="0" smtClean="0">
+                <a:solidFill>
+                  <a:schemeClr val="tx1"/>
+                </a:solidFill>
+                <a:effectLst/>
+                <a:latin typeface="+mn-lt"/>
+                <a:ea typeface="+mn-ea"/>
+                <a:cs typeface="+mn-cs"/>
+              </a:rPr>
+              <a:t>Diese Zeit kann benutzt werden um Rückschlüsse über die derzeitige Helligkeit zu liefern</a:t>
+            </a:r>
+            <a:endParaRPr lang="en-GB" sz="1200" kern="1200" dirty="0" smtClean="0">
+              <a:solidFill>
+                <a:schemeClr val="tx1"/>
+              </a:solidFill>
+              <a:effectLst/>
+              <a:latin typeface="+mn-lt"/>
+              <a:ea typeface="+mn-ea"/>
+              <a:cs typeface="+mn-cs"/>
+            </a:endParaRPr>
+          </a:p>
+          <a:p>
+            <a:r>
+              <a:rPr lang="de-DE" sz="1200" kern="1200" dirty="0" smtClean="0">
+                <a:solidFill>
+                  <a:schemeClr val="tx1"/>
+                </a:solidFill>
+                <a:effectLst/>
+                <a:latin typeface="+mn-lt"/>
+                <a:ea typeface="+mn-ea"/>
+                <a:cs typeface="+mn-cs"/>
+              </a:rPr>
+              <a:t>Aufgrund der ungenauen Messergebnisse verwarfen wir unsere ursprüngliche Idee</a:t>
+            </a:r>
+          </a:p>
+          <a:p>
+            <a:endParaRPr lang="en-GB" sz="1200" kern="1200" dirty="0" smtClean="0">
+              <a:solidFill>
+                <a:schemeClr val="tx1"/>
+              </a:solidFill>
+              <a:effectLst/>
+              <a:latin typeface="+mn-lt"/>
+              <a:ea typeface="+mn-ea"/>
+              <a:cs typeface="+mn-cs"/>
+            </a:endParaRPr>
+          </a:p>
+          <a:p>
+            <a:r>
+              <a:rPr lang="de-DE" sz="1200" kern="1200" dirty="0" smtClean="0">
+                <a:solidFill>
+                  <a:schemeClr val="tx1"/>
+                </a:solidFill>
+                <a:effectLst/>
+                <a:latin typeface="+mn-lt"/>
+                <a:ea typeface="+mn-ea"/>
+                <a:cs typeface="+mn-cs"/>
+              </a:rPr>
+              <a:t>Umgesetzt wurde:</a:t>
+            </a:r>
+            <a:endParaRPr lang="en-GB" sz="1200" kern="1200" dirty="0" smtClean="0">
+              <a:solidFill>
+                <a:schemeClr val="tx1"/>
+              </a:solidFill>
+              <a:effectLst/>
+              <a:latin typeface="+mn-lt"/>
+              <a:ea typeface="+mn-ea"/>
+              <a:cs typeface="+mn-cs"/>
+            </a:endParaRPr>
+          </a:p>
+          <a:p>
+            <a:r>
+              <a:rPr lang="de-DE" sz="1200" kern="1200" dirty="0" smtClean="0">
+                <a:solidFill>
+                  <a:schemeClr val="tx1"/>
+                </a:solidFill>
+                <a:effectLst/>
+                <a:latin typeface="+mn-lt"/>
+                <a:ea typeface="+mn-ea"/>
+                <a:cs typeface="+mn-cs"/>
+              </a:rPr>
+              <a:t>Programm im Server-Client Verbund</a:t>
+            </a:r>
+            <a:endParaRPr lang="en-GB" sz="1200" kern="1200" dirty="0" smtClean="0">
+              <a:solidFill>
+                <a:schemeClr val="tx1"/>
+              </a:solidFill>
+              <a:effectLst/>
+              <a:latin typeface="+mn-lt"/>
+              <a:ea typeface="+mn-ea"/>
+              <a:cs typeface="+mn-cs"/>
+            </a:endParaRPr>
+          </a:p>
+          <a:p>
+            <a:r>
+              <a:rPr lang="de-DE" sz="1200" kern="1200" dirty="0" smtClean="0">
+                <a:solidFill>
+                  <a:schemeClr val="tx1"/>
+                </a:solidFill>
+                <a:effectLst/>
+                <a:latin typeface="+mn-lt"/>
+                <a:ea typeface="+mn-ea"/>
+                <a:cs typeface="+mn-cs"/>
+              </a:rPr>
+              <a:t>Client misst Lichtintensität im 5 Sekunden Intervall</a:t>
+            </a:r>
+            <a:endParaRPr lang="en-GB" sz="1200" kern="1200" dirty="0" smtClean="0">
+              <a:solidFill>
+                <a:schemeClr val="tx1"/>
+              </a:solidFill>
+              <a:effectLst/>
+              <a:latin typeface="+mn-lt"/>
+              <a:ea typeface="+mn-ea"/>
+              <a:cs typeface="+mn-cs"/>
+            </a:endParaRPr>
+          </a:p>
+          <a:p>
+            <a:r>
+              <a:rPr lang="de-DE" sz="1200" kern="1200" dirty="0" smtClean="0">
+                <a:solidFill>
+                  <a:schemeClr val="tx1"/>
+                </a:solidFill>
+                <a:effectLst/>
+                <a:latin typeface="+mn-lt"/>
+                <a:ea typeface="+mn-ea"/>
+                <a:cs typeface="+mn-cs"/>
+              </a:rPr>
+              <a:t>Schickt Daten alle 5 Minuten zum Server</a:t>
+            </a:r>
+          </a:p>
+          <a:p>
+            <a:endParaRPr lang="en-GB" sz="1200" kern="1200" dirty="0" smtClean="0">
+              <a:solidFill>
+                <a:schemeClr val="tx1"/>
+              </a:solidFill>
+              <a:effectLst/>
+              <a:latin typeface="+mn-lt"/>
+              <a:ea typeface="+mn-ea"/>
+              <a:cs typeface="+mn-cs"/>
+            </a:endParaRPr>
+          </a:p>
+          <a:p>
+            <a:r>
+              <a:rPr lang="de-DE" sz="1200" kern="1200" dirty="0" smtClean="0">
+                <a:solidFill>
+                  <a:schemeClr val="tx1"/>
+                </a:solidFill>
+                <a:effectLst/>
+                <a:latin typeface="+mn-lt"/>
+                <a:ea typeface="+mn-ea"/>
+                <a:cs typeface="+mn-cs"/>
+              </a:rPr>
+              <a:t>Da wir nur Werte gebrauchen können die gemessen werden währen die Sonne scheint </a:t>
+            </a:r>
+            <a:r>
+              <a:rPr lang="de-DE" sz="1200" kern="1200" dirty="0" smtClean="0">
+                <a:solidFill>
+                  <a:schemeClr val="tx1"/>
+                </a:solidFill>
+                <a:effectLst/>
+                <a:latin typeface="+mn-lt"/>
+                <a:ea typeface="+mn-ea"/>
+                <a:cs typeface="+mn-cs"/>
+                <a:sym typeface="Wingdings" charset="2"/>
+              </a:rPr>
+              <a:t></a:t>
+            </a:r>
+            <a:r>
+              <a:rPr lang="de-DE" sz="1200" kern="1200" dirty="0" smtClean="0">
+                <a:solidFill>
+                  <a:schemeClr val="tx1"/>
+                </a:solidFill>
+                <a:effectLst/>
+                <a:latin typeface="+mn-lt"/>
+                <a:ea typeface="+mn-ea"/>
+                <a:cs typeface="+mn-cs"/>
+              </a:rPr>
+              <a:t> Steffen erläutern</a:t>
+            </a:r>
+            <a:endParaRPr lang="en-GB" sz="1200" kern="1200" dirty="0" smtClean="0">
+              <a:solidFill>
+                <a:schemeClr val="tx1"/>
+              </a:solidFill>
+              <a:effectLst/>
+              <a:latin typeface="+mn-lt"/>
+              <a:ea typeface="+mn-ea"/>
+              <a:cs typeface="+mn-cs"/>
+            </a:endParaRPr>
+          </a:p>
+          <a:p>
+            <a:r>
+              <a:rPr lang="de-DE" sz="1200" kern="1200" dirty="0" smtClean="0">
+                <a:solidFill>
+                  <a:schemeClr val="tx1"/>
+                </a:solidFill>
+                <a:effectLst/>
+                <a:latin typeface="+mn-lt"/>
+                <a:ea typeface="+mn-ea"/>
+                <a:cs typeface="+mn-cs"/>
+              </a:rPr>
+              <a:t>Formel gefunden die anhand des Standortes die Sonnenaufgangs- sowie Sonnenuntergangszeit zu berechnet</a:t>
+            </a:r>
+            <a:endParaRPr lang="en-GB" sz="1200" kern="1200" dirty="0" smtClean="0">
+              <a:solidFill>
+                <a:schemeClr val="tx1"/>
+              </a:solidFill>
+              <a:effectLst/>
+              <a:latin typeface="+mn-lt"/>
+              <a:ea typeface="+mn-ea"/>
+              <a:cs typeface="+mn-cs"/>
+            </a:endParaRPr>
+          </a:p>
+          <a:p>
+            <a:endParaRPr lang="de-DE" dirty="0"/>
+          </a:p>
+        </p:txBody>
+      </p:sp>
+      <p:sp>
+        <p:nvSpPr>
+          <p:cNvPr id="4" name="Slide Number Placeholder 3"/>
+          <p:cNvSpPr>
+            <a:spLocks noGrp="1"/>
+          </p:cNvSpPr>
+          <p:nvPr>
+            <p:ph type="sldNum" sz="quarter" idx="10"/>
+          </p:nvPr>
+        </p:nvSpPr>
+        <p:spPr/>
+        <p:txBody>
+          <a:bodyPr/>
+          <a:lstStyle/>
+          <a:p>
+            <a:fld id="{FF15405E-4AB1-1C4A-8F75-D830CB03AB8E}" type="slidenum">
+              <a:rPr lang="de-DE" smtClean="0"/>
+              <a:t>5</a:t>
+            </a:fld>
+            <a:endParaRPr lang="de-DE"/>
+          </a:p>
+        </p:txBody>
+      </p:sp>
+    </p:spTree>
+    <p:extLst>
+      <p:ext uri="{BB962C8B-B14F-4D97-AF65-F5344CB8AC3E}">
+        <p14:creationId xmlns:p14="http://schemas.microsoft.com/office/powerpoint/2010/main" val="585453039"/>
+      </p:ext>
+    </p:extLst>
+  </p:cSld>
+  <p:clrMapOvr>
+    <a:masterClrMapping/>
+  </p:clrMapOvr>
+</p:notes>
+</file>
+
+<file path=ppt/notesSlides/notesSlide5.xml><?xml version="1.0" encoding="utf-8"?>
+<p:notes xmlns:a="http://schemas.openxmlformats.org/drawingml/2006/main" xmlns:r="http://schemas.openxmlformats.org/officeDocument/2006/relationships" xmlns:p="http://schemas.openxmlformats.org/presentationml/2006/main">
+  <p:cSld>
+    <p:spTree>
+      <p:nvGrpSpPr>
+        <p:cNvPr id="1" name=""/>
+        <p:cNvGrpSpPr/>
+        <p:nvPr/>
+      </p:nvGrpSpPr>
+      <p:grpSpPr>
+        <a:xfrm>
+          <a:off x="0" y="0"/>
+          <a:ext cx="0" cy="0"/>
+          <a:chOff x="0" y="0"/>
+          <a:chExt cx="0" cy="0"/>
+        </a:xfrm>
+      </p:grpSpPr>
+      <p:sp>
+        <p:nvSpPr>
+          <p:cNvPr id="2" name="Slide Image Placeholder 1"/>
+          <p:cNvSpPr>
+            <a:spLocks noGrp="1" noRot="1" noChangeAspect="1"/>
+          </p:cNvSpPr>
+          <p:nvPr>
+            <p:ph type="sldImg"/>
+          </p:nvPr>
+        </p:nvSpPr>
+        <p:spPr/>
+      </p:sp>
+      <p:sp>
+        <p:nvSpPr>
+          <p:cNvPr id="3" name="Notes Placeholder 2"/>
+          <p:cNvSpPr>
+            <a:spLocks noGrp="1"/>
+          </p:cNvSpPr>
+          <p:nvPr>
+            <p:ph type="body" idx="1"/>
+          </p:nvPr>
+        </p:nvSpPr>
+        <p:spPr/>
+        <p:txBody>
+          <a:bodyPr/>
+          <a:lstStyle/>
+          <a:p>
+            <a:pPr marL="171450" indent="-171450">
+              <a:buFont typeface="Arial" charset="0"/>
+              <a:buChar char="•"/>
+            </a:pPr>
+            <a:r>
+              <a:rPr lang="de-DE" dirty="0" smtClean="0"/>
+              <a:t>Ziel</a:t>
+            </a:r>
+          </a:p>
+          <a:p>
+            <a:pPr marL="171450" indent="-171450">
+              <a:buFont typeface="Arial" charset="0"/>
+              <a:buChar char="•"/>
+            </a:pPr>
+            <a:r>
+              <a:rPr lang="de-DE" dirty="0" smtClean="0"/>
+              <a:t>Umgesetzt</a:t>
+            </a:r>
+            <a:r>
+              <a:rPr lang="de-DE" baseline="0" dirty="0" smtClean="0"/>
+              <a:t> wurde:</a:t>
+            </a:r>
+          </a:p>
+          <a:p>
+            <a:pPr marL="628650" lvl="1" indent="-171450">
+              <a:buFont typeface="Arial" charset="0"/>
+              <a:buChar char="•"/>
+            </a:pPr>
+            <a:r>
+              <a:rPr lang="de-DE" baseline="0" dirty="0" smtClean="0"/>
+              <a:t>Ausgabe des Servers</a:t>
+            </a:r>
+          </a:p>
+          <a:p>
+            <a:pPr marL="628650" lvl="1" indent="-171450">
+              <a:buFont typeface="Arial" charset="0"/>
+              <a:buChar char="•"/>
+            </a:pPr>
+            <a:r>
+              <a:rPr lang="de-DE" baseline="0" dirty="0" smtClean="0"/>
+              <a:t>Bestandteile</a:t>
+            </a:r>
+          </a:p>
+          <a:p>
+            <a:pPr marL="628650" lvl="1" indent="-171450">
+              <a:buFont typeface="Arial" charset="0"/>
+              <a:buChar char="•"/>
+            </a:pPr>
+            <a:r>
+              <a:rPr lang="de-DE" baseline="0" dirty="0" smtClean="0"/>
+              <a:t>API</a:t>
+            </a:r>
+          </a:p>
+          <a:p>
+            <a:pPr marL="628650" lvl="1" indent="-171450">
+              <a:buFont typeface="Arial" charset="0"/>
+              <a:buChar char="•"/>
+            </a:pPr>
+            <a:r>
+              <a:rPr lang="de-DE" baseline="0" dirty="0" smtClean="0"/>
+              <a:t>Pages</a:t>
+            </a:r>
+          </a:p>
+          <a:p>
+            <a:pPr marL="628650" lvl="1" indent="-171450">
+              <a:buFont typeface="Arial" charset="0"/>
+              <a:buChar char="•"/>
+            </a:pPr>
+            <a:r>
+              <a:rPr lang="de-DE" baseline="0" dirty="0" smtClean="0"/>
+              <a:t>Datenbank</a:t>
+            </a:r>
+          </a:p>
+          <a:p>
+            <a:pPr marL="628650" lvl="1" indent="-171450">
+              <a:buFont typeface="Arial" charset="0"/>
+              <a:buChar char="•"/>
+            </a:pPr>
+            <a:r>
+              <a:rPr lang="de-DE" baseline="0" dirty="0" smtClean="0"/>
+              <a:t>Hosting</a:t>
+            </a:r>
+          </a:p>
+          <a:p>
+            <a:pPr marL="171450" indent="-171450">
+              <a:buFont typeface="Arial" charset="0"/>
+              <a:buChar char="•"/>
+            </a:pPr>
+            <a:r>
+              <a:rPr lang="de-DE" baseline="0" dirty="0" smtClean="0"/>
+              <a:t>Probleme</a:t>
+            </a:r>
+          </a:p>
+          <a:p>
+            <a:pPr marL="628650" lvl="1" indent="-171450">
+              <a:buFont typeface="Arial" charset="0"/>
+              <a:buChar char="•"/>
+            </a:pPr>
+            <a:r>
+              <a:rPr lang="de-DE" baseline="0" dirty="0" smtClean="0"/>
+              <a:t>Datenbank</a:t>
+            </a:r>
+          </a:p>
+          <a:p>
+            <a:pPr marL="628650" lvl="1" indent="-171450">
+              <a:buFont typeface="Arial" charset="0"/>
+              <a:buChar char="•"/>
+            </a:pPr>
+            <a:r>
+              <a:rPr lang="de-DE" baseline="0" dirty="0" smtClean="0"/>
+              <a:t>API</a:t>
+            </a:r>
+          </a:p>
+          <a:p>
+            <a:pPr marL="628650" lvl="1" indent="-171450">
+              <a:buFont typeface="Arial" charset="0"/>
+              <a:buChar char="•"/>
+            </a:pPr>
+            <a:endParaRPr lang="de-DE" baseline="0" dirty="0" smtClean="0"/>
+          </a:p>
+        </p:txBody>
+      </p:sp>
+      <p:sp>
+        <p:nvSpPr>
+          <p:cNvPr id="4" name="Slide Number Placeholder 3"/>
+          <p:cNvSpPr>
+            <a:spLocks noGrp="1"/>
+          </p:cNvSpPr>
+          <p:nvPr>
+            <p:ph type="sldNum" sz="quarter" idx="10"/>
+          </p:nvPr>
+        </p:nvSpPr>
+        <p:spPr/>
+        <p:txBody>
+          <a:bodyPr/>
+          <a:lstStyle/>
+          <a:p>
+            <a:fld id="{FF15405E-4AB1-1C4A-8F75-D830CB03AB8E}" type="slidenum">
+              <a:rPr lang="de-DE" smtClean="0"/>
+              <a:t>6</a:t>
+            </a:fld>
+            <a:endParaRPr lang="de-DE"/>
+          </a:p>
+        </p:txBody>
+      </p:sp>
+    </p:spTree>
+    <p:extLst>
+      <p:ext uri="{BB962C8B-B14F-4D97-AF65-F5344CB8AC3E}">
+        <p14:creationId xmlns:p14="http://schemas.microsoft.com/office/powerpoint/2010/main" val="2086639566"/>
+      </p:ext>
+    </p:extLst>
+  </p:cSld>
+  <p:clrMapOvr>
+    <a:masterClrMapping/>
+  </p:clrMapOvr>
+</p:notes>
+</file>
+
+<file path=ppt/notesSlides/notesSlide6.xml><?xml version="1.0" encoding="utf-8"?>
+<p:notes xmlns:a="http://schemas.openxmlformats.org/drawingml/2006/main" xmlns:r="http://schemas.openxmlformats.org/officeDocument/2006/relationships" xmlns:p="http://schemas.openxmlformats.org/presentationml/2006/main">
+  <p:cSld>
+    <p:spTree>
+      <p:nvGrpSpPr>
+        <p:cNvPr id="1" name=""/>
+        <p:cNvGrpSpPr/>
+        <p:nvPr/>
+      </p:nvGrpSpPr>
+      <p:grpSpPr>
+        <a:xfrm>
+          <a:off x="0" y="0"/>
+          <a:ext cx="0" cy="0"/>
+          <a:chOff x="0" y="0"/>
+          <a:chExt cx="0" cy="0"/>
+        </a:xfrm>
+      </p:grpSpPr>
+      <p:sp>
+        <p:nvSpPr>
+          <p:cNvPr id="2" name="Slide Image Placeholder 1"/>
+          <p:cNvSpPr>
+            <a:spLocks noGrp="1" noRot="1" noChangeAspect="1"/>
+          </p:cNvSpPr>
+          <p:nvPr>
+            <p:ph type="sldImg"/>
+          </p:nvPr>
+        </p:nvSpPr>
+        <p:spPr/>
+      </p:sp>
+      <p:sp>
+        <p:nvSpPr>
+          <p:cNvPr id="3" name="Notes Placeholder 2"/>
+          <p:cNvSpPr>
+            <a:spLocks noGrp="1"/>
+          </p:cNvSpPr>
+          <p:nvPr>
+            <p:ph type="body" idx="1"/>
+          </p:nvPr>
+        </p:nvSpPr>
+        <p:spPr/>
+        <p:txBody>
+          <a:bodyPr/>
+          <a:lstStyle/>
+          <a:p>
+            <a:endParaRPr lang="de-DE" dirty="0"/>
+          </a:p>
+        </p:txBody>
+      </p:sp>
+      <p:sp>
+        <p:nvSpPr>
+          <p:cNvPr id="4" name="Slide Number Placeholder 3"/>
+          <p:cNvSpPr>
+            <a:spLocks noGrp="1"/>
+          </p:cNvSpPr>
+          <p:nvPr>
+            <p:ph type="sldNum" sz="quarter" idx="10"/>
+          </p:nvPr>
+        </p:nvSpPr>
+        <p:spPr/>
+        <p:txBody>
+          <a:bodyPr/>
+          <a:lstStyle/>
+          <a:p>
+            <a:fld id="{FF15405E-4AB1-1C4A-8F75-D830CB03AB8E}" type="slidenum">
+              <a:rPr lang="de-DE" smtClean="0"/>
+              <a:t>8</a:t>
+            </a:fld>
+            <a:endParaRPr lang="de-DE"/>
+          </a:p>
+        </p:txBody>
+      </p:sp>
+    </p:spTree>
+    <p:extLst>
+      <p:ext uri="{BB962C8B-B14F-4D97-AF65-F5344CB8AC3E}">
+        <p14:creationId xmlns:p14="http://schemas.microsoft.com/office/powerpoint/2010/main" val="1266485427"/>
+      </p:ext>
+    </p:extLst>
+  </p:cSld>
+  <p:clrMapOvr>
+    <a:masterClrMapping/>
+  </p:clrMapOvr>
+</p:notes>
 </file>
 
 <file path=ppt/slideLayouts/slideLayout1.xml><?xml version="1.0" encoding="utf-8"?>
@@ -329,7 +4164,7 @@
           <a:p>
             <a:fld id="{9AB3A824-1A51-4B26-AD58-A6D8E14F6C04}" type="datetimeFigureOut">
               <a:rPr lang="en-US" dirty="0"/>
-              <a:t>7/3/17</a:t>
+              <a:t>7/5/17</a:t>
             </a:fld>
             <a:endParaRPr lang="en-US" dirty="0"/>
           </a:p>
@@ -663,7 +4498,7 @@
           <a:p>
             <a:fld id="{D857E33E-8B18-4087-B112-809917729534}" type="datetimeFigureOut">
               <a:rPr lang="en-US" dirty="0"/>
-              <a:t>7/3/17</a:t>
+              <a:t>7/5/17</a:t>
             </a:fld>
             <a:endParaRPr lang="en-US" dirty="0"/>
           </a:p>
@@ -965,7 +4800,7 @@
           <a:p>
             <a:fld id="{D3FFE419-2371-464F-8239-3959401C3561}" type="datetimeFigureOut">
               <a:rPr lang="en-US" dirty="0"/>
-              <a:t>7/3/17</a:t>
+              <a:t>7/5/17</a:t>
             </a:fld>
             <a:endParaRPr lang="en-US" dirty="0"/>
           </a:p>
@@ -1212,7 +5047,7 @@
           <a:p>
             <a:fld id="{97D162C4-EDD9-4389-A98B-B87ECEA2A816}" type="datetimeFigureOut">
               <a:rPr lang="en-US" dirty="0"/>
-              <a:t>7/3/17</a:t>
+              <a:t>7/5/17</a:t>
             </a:fld>
             <a:endParaRPr lang="en-US" dirty="0"/>
           </a:p>
@@ -1619,7 +5454,7 @@
           <a:p>
             <a:fld id="{3E5059C3-6A89-4494-99FF-5A4D6FFD50EB}" type="datetimeFigureOut">
               <a:rPr lang="en-US" dirty="0"/>
-              <a:t>7/3/17</a:t>
+              <a:t>7/5/17</a:t>
             </a:fld>
             <a:endParaRPr lang="en-US" dirty="0"/>
           </a:p>
@@ -1933,7 +5768,7 @@
           <a:p>
             <a:fld id="{CA954B2F-12DE-47F5-8894-472B206D2E1E}" type="datetimeFigureOut">
               <a:rPr lang="en-US" dirty="0"/>
-              <a:t>7/3/17</a:t>
+              <a:t>7/5/17</a:t>
             </a:fld>
             <a:endParaRPr lang="en-US" dirty="0"/>
           </a:p>
@@ -2477,7 +6312,7 @@
           <a:p>
             <a:fld id="{3F30E46F-7819-4ACF-B48B-48222C2ACC88}" type="datetimeFigureOut">
               <a:rPr lang="en-US" dirty="0"/>
-              <a:t>7/3/17</a:t>
+              <a:t>7/5/17</a:t>
             </a:fld>
             <a:endParaRPr lang="en-US" dirty="0"/>
           </a:p>
@@ -2672,7 +6507,7 @@
           <a:p>
             <a:fld id="{1FAF3416-4057-4DAA-829D-4CA07428D088}" type="datetimeFigureOut">
               <a:rPr lang="en-US" dirty="0"/>
-              <a:t>7/3/17</a:t>
+              <a:t>7/5/17</a:t>
             </a:fld>
             <a:endParaRPr lang="en-US" dirty="0"/>
           </a:p>
@@ -2885,7 +6720,7 @@
           <a:p>
             <a:fld id="{921D9284-D300-4297-87F7-E791DCC15DB1}" type="datetimeFigureOut">
               <a:rPr lang="en-US" dirty="0"/>
-              <a:t>7/3/17</a:t>
+              <a:t>7/5/17</a:t>
             </a:fld>
             <a:endParaRPr lang="en-US" dirty="0"/>
           </a:p>
@@ -3254,7 +7089,7 @@
           <a:p>
             <a:fld id="{37D525BB-DA17-4BA0-B3C8-3AC3ABC827E6}" type="datetimeFigureOut">
               <a:rPr lang="en-US" dirty="0"/>
-              <a:t>7/3/17</a:t>
+              <a:t>7/5/17</a:t>
             </a:fld>
             <a:endParaRPr lang="en-US" dirty="0"/>
           </a:p>
@@ -3657,7 +7492,7 @@
           <a:p>
             <a:fld id="{B16C4C9A-3960-41CF-A4E9-2A8FB932454B}" type="datetimeFigureOut">
               <a:rPr lang="en-US" dirty="0"/>
-              <a:t>7/3/17</a:t>
+              <a:t>7/5/17</a:t>
             </a:fld>
             <a:endParaRPr lang="en-US" dirty="0"/>
           </a:p>
@@ -3995,7 +7830,7 @@
           <a:p>
             <a:fld id="{3CBC1C18-307B-4F68-A007-B5B542270E8D}" type="datetimeFigureOut">
               <a:rPr lang="en-US" dirty="0"/>
-              <a:t>7/3/17</a:t>
+              <a:t>7/5/17</a:t>
             </a:fld>
             <a:endParaRPr lang="en-US" dirty="0"/>
           </a:p>
@@ -4618,6 +8453,13 @@
   <p:clrMapOvr>
     <a:masterClrMapping/>
   </p:clrMapOvr>
+  <p:timing>
+    <p:tnLst>
+      <p:par>
+        <p:cTn id="1" dur="indefinite" restart="never" nodeType="tmRoot"/>
+      </p:par>
+    </p:tnLst>
+  </p:timing>
 </p:sld>
 </file>
 
@@ -4680,7 +8522,7 @@
           </p:nvPr>
         </p:nvPicPr>
         <p:blipFill>
-          <a:blip r:embed="rId2">
+          <a:blip r:embed="rId3">
             <a:extLst>
               <a:ext uri="{28A0092B-C50C-407E-A947-70E740481C1C}">
                 <a14:useLocalDpi xmlns:a14="http://schemas.microsoft.com/office/drawing/2010/main" val="0"/>
@@ -4708,6 +8550,13 @@
   <p:clrMapOvr>
     <a:masterClrMapping/>
   </p:clrMapOvr>
+  <p:timing>
+    <p:tnLst>
+      <p:par>
+        <p:cTn id="1" dur="indefinite" restart="never" nodeType="tmRoot"/>
+      </p:par>
+    </p:tnLst>
+  </p:timing>
 </p:sld>
 </file>
 
@@ -4728,6 +8577,110 @@
           <a:chExt cx="0" cy="0"/>
         </a:xfrm>
       </p:grpSpPr>
+      <p:pic>
+        <p:nvPicPr>
+          <p:cNvPr id="4" name="Inhaltsplatzhalter 3"/>
+          <p:cNvPicPr>
+            <a:picLocks noGrp="1" noChangeAspect="1"/>
+          </p:cNvPicPr>
+          <p:nvPr>
+            <p:ph idx="1"/>
+          </p:nvPr>
+        </p:nvPicPr>
+        <p:blipFill>
+          <a:blip r:embed="rId3">
+            <a:extLst>
+              <a:ext uri="{28A0092B-C50C-407E-A947-70E740481C1C}">
+                <a14:useLocalDpi xmlns:a14="http://schemas.microsoft.com/office/drawing/2010/main" val="0"/>
+              </a:ext>
+            </a:extLst>
+          </a:blip>
+          <a:stretch>
+            <a:fillRect/>
+          </a:stretch>
+        </p:blipFill>
+        <p:spPr>
+          <a:xfrm>
+            <a:off x="3012100" y="588938"/>
+            <a:ext cx="8345712" cy="5892073"/>
+          </a:xfrm>
+        </p:spPr>
+      </p:pic>
+      <p:sp>
+        <p:nvSpPr>
+          <p:cNvPr id="5" name="Textfeld 4"/>
+          <p:cNvSpPr txBox="1"/>
+          <p:nvPr/>
+        </p:nvSpPr>
+        <p:spPr>
+          <a:xfrm>
+            <a:off x="3198490" y="6488668"/>
+            <a:ext cx="8807116" cy="369332"/>
+          </a:xfrm>
+          <a:prstGeom prst="rect">
+            <a:avLst/>
+          </a:prstGeom>
+          <a:noFill/>
+        </p:spPr>
+        <p:txBody>
+          <a:bodyPr wrap="square" rtlCol="0">
+            <a:spAutoFit/>
+          </a:bodyPr>
+          <a:lstStyle/>
+          <a:p>
+            <a:r>
+              <a:rPr lang="de-DE" dirty="0"/>
+              <a:t>Bildquelle: https://</a:t>
+            </a:r>
+            <a:r>
+              <a:rPr lang="de-DE" dirty="0" err="1"/>
+              <a:t>de.wikipedia.org</a:t>
+            </a:r>
+            <a:r>
+              <a:rPr lang="de-DE" dirty="0"/>
+              <a:t>/</a:t>
+            </a:r>
+            <a:r>
+              <a:rPr lang="de-DE" dirty="0" err="1"/>
+              <a:t>wiki</a:t>
+            </a:r>
+            <a:r>
+              <a:rPr lang="de-DE" dirty="0"/>
+              <a:t>/Globalstrahlung</a:t>
+            </a:r>
+          </a:p>
+        </p:txBody>
+      </p:sp>
+    </p:spTree>
+    <p:extLst>
+      <p:ext uri="{BB962C8B-B14F-4D97-AF65-F5344CB8AC3E}">
+        <p14:creationId xmlns:p14="http://schemas.microsoft.com/office/powerpoint/2010/main" val="1188749329"/>
+      </p:ext>
+    </p:extLst>
+  </p:cSld>
+  <p:clrMapOvr>
+    <a:masterClrMapping/>
+  </p:clrMapOvr>
+</p:sld>
+</file>
+
+<file path=ppt/slides/slide4.xml><?xml version="1.0" encoding="utf-8"?>
+<p:sld xmlns:a="http://schemas.openxmlformats.org/drawingml/2006/main" xmlns:r="http://schemas.openxmlformats.org/officeDocument/2006/relationships" xmlns:p="http://schemas.openxmlformats.org/presentationml/2006/main">
+  <p:cSld>
+    <p:spTree>
+      <p:nvGrpSpPr>
+        <p:cNvPr id="1" name=""/>
+        <p:cNvGrpSpPr/>
+        <p:nvPr/>
+      </p:nvGrpSpPr>
+      <p:grpSpPr>
+        <a:xfrm>
+          <a:off x="0" y="0"/>
+          <a:ext cx="0" cy="0"/>
+          <a:chOff x="0" y="0"/>
+          <a:chExt cx="0" cy="0"/>
+        </a:xfrm>
+      </p:grpSpPr>
       <p:sp>
         <p:nvSpPr>
           <p:cNvPr id="2" name="Title 1"/>
@@ -4793,7 +8746,7 @@
           </p:nvPr>
         </p:nvPicPr>
         <p:blipFill>
-          <a:blip r:embed="rId2">
+          <a:blip r:embed="rId3">
             <a:extLst>
               <a:ext uri="{28A0092B-C50C-407E-A947-70E740481C1C}">
                 <a14:useLocalDpi xmlns:a14="http://schemas.microsoft.com/office/drawing/2010/main" val="0"/>
@@ -4821,10 +8774,17 @@
   <p:clrMapOvr>
     <a:masterClrMapping/>
   </p:clrMapOvr>
+  <p:timing>
+    <p:tnLst>
+      <p:par>
+        <p:cTn id="1" dur="indefinite" restart="never" nodeType="tmRoot"/>
+      </p:par>
+    </p:tnLst>
+  </p:timing>
 </p:sld>
 </file>
 
-<file path=ppt/slides/slide4.xml><?xml version="1.0" encoding="utf-8"?>
+<file path=ppt/slides/slide5.xml><?xml version="1.0" encoding="utf-8"?>
 <p:sld xmlns:a="http://schemas.openxmlformats.org/drawingml/2006/main" xmlns:r="http://schemas.openxmlformats.org/officeDocument/2006/relationships" xmlns:p="http://schemas.openxmlformats.org/presentationml/2006/main">
   <p:cSld>
     <p:spTree>
@@ -4891,7 +8851,7 @@
           </p:nvPr>
         </p:nvPicPr>
         <p:blipFill>
-          <a:blip r:embed="rId2">
+          <a:blip r:embed="rId3">
             <a:extLst>
               <a:ext uri="{28A0092B-C50C-407E-A947-70E740481C1C}">
                 <a14:useLocalDpi xmlns:a14="http://schemas.microsoft.com/office/drawing/2010/main" val="0"/>
@@ -4919,10 +8879,17 @@
   <p:clrMapOvr>
     <a:masterClrMapping/>
   </p:clrMapOvr>
+  <p:timing>
+    <p:tnLst>
+      <p:par>
+        <p:cTn id="1" dur="indefinite" restart="never" nodeType="tmRoot"/>
+      </p:par>
+    </p:tnLst>
+  </p:timing>
 </p:sld>
 </file>
 
-<file path=ppt/slides/slide5.xml><?xml version="1.0" encoding="utf-8"?>
+<file path=ppt/slides/slide6.xml><?xml version="1.0" encoding="utf-8"?>
 <p:sld xmlns:a="http://schemas.openxmlformats.org/drawingml/2006/main" xmlns:r="http://schemas.openxmlformats.org/officeDocument/2006/relationships" xmlns:p="http://schemas.openxmlformats.org/presentationml/2006/main">
   <p:cSld>
     <p:spTree>
@@ -4997,7 +8964,7 @@
           </p:nvPr>
         </p:nvPicPr>
         <p:blipFill>
-          <a:blip r:embed="rId2">
+          <a:blip r:embed="rId3">
             <a:extLst>
               <a:ext uri="{28A0092B-C50C-407E-A947-70E740481C1C}">
                 <a14:useLocalDpi xmlns:a14="http://schemas.microsoft.com/office/drawing/2010/main" val="0"/>
@@ -5025,10 +8992,17 @@
   <p:clrMapOvr>
     <a:masterClrMapping/>
   </p:clrMapOvr>
+  <p:timing>
+    <p:tnLst>
+      <p:par>
+        <p:cTn id="1" dur="indefinite" restart="never" nodeType="tmRoot"/>
+      </p:par>
+    </p:tnLst>
+  </p:timing>
 </p:sld>
 </file>
 
-<file path=ppt/slides/slide6.xml><?xml version="1.0" encoding="utf-8"?>
+<file path=ppt/slides/slide7.xml><?xml version="1.0" encoding="utf-8"?>
 <p:sld xmlns:a="http://schemas.openxmlformats.org/drawingml/2006/main" xmlns:r="http://schemas.openxmlformats.org/officeDocument/2006/relationships" xmlns:p="http://schemas.openxmlformats.org/presentationml/2006/main">
   <p:cSld>
     <p:spTree>
@@ -5055,6 +9029,93 @@
             <p:ph type="title"/>
           </p:nvPr>
         </p:nvSpPr>
+        <p:spPr>
+          <a:xfrm>
+            <a:off x="3333703" y="269440"/>
+            <a:ext cx="7958331" cy="1077229"/>
+          </a:xfrm>
+        </p:spPr>
+        <p:txBody>
+          <a:bodyPr/>
+          <a:lstStyle/>
+          <a:p>
+            <a:r>
+              <a:rPr lang="de-DE" dirty="0" smtClean="0"/>
+              <a:t>Auswertung</a:t>
+            </a:r>
+            <a:endParaRPr lang="de-DE" dirty="0"/>
+          </a:p>
+        </p:txBody>
+      </p:sp>
+      <p:pic>
+        <p:nvPicPr>
+          <p:cNvPr id="4" name="Content Placeholder 3"/>
+          <p:cNvPicPr>
+            <a:picLocks noGrp="1" noChangeAspect="1"/>
+          </p:cNvPicPr>
+          <p:nvPr>
+            <p:ph idx="1"/>
+          </p:nvPr>
+        </p:nvPicPr>
+        <p:blipFill>
+          <a:blip r:embed="rId2">
+            <a:extLst>
+              <a:ext uri="{28A0092B-C50C-407E-A947-70E740481C1C}">
+                <a14:useLocalDpi xmlns:a14="http://schemas.microsoft.com/office/drawing/2010/main" val="0"/>
+              </a:ext>
+            </a:extLst>
+          </a:blip>
+          <a:stretch>
+            <a:fillRect/>
+          </a:stretch>
+        </p:blipFill>
+        <p:spPr>
+          <a:xfrm>
+            <a:off x="1573554" y="-513"/>
+            <a:ext cx="7105224" cy="6858513"/>
+          </a:xfrm>
+        </p:spPr>
+      </p:pic>
+    </p:spTree>
+    <p:extLst>
+      <p:ext uri="{BB962C8B-B14F-4D97-AF65-F5344CB8AC3E}">
+        <p14:creationId xmlns:p14="http://schemas.microsoft.com/office/powerpoint/2010/main" val="1524046364"/>
+      </p:ext>
+    </p:extLst>
+  </p:cSld>
+  <p:clrMapOvr>
+    <a:masterClrMapping/>
+  </p:clrMapOvr>
+</p:sld>
+</file>
+
+<file path=ppt/slides/slide8.xml><?xml version="1.0" encoding="utf-8"?>
+<p:sld xmlns:a="http://schemas.openxmlformats.org/drawingml/2006/main" xmlns:r="http://schemas.openxmlformats.org/officeDocument/2006/relationships" xmlns:p="http://schemas.openxmlformats.org/presentationml/2006/main">
+  <p:cSld>
+    <p:spTree>
+      <p:nvGrpSpPr>
+        <p:cNvPr id="1" name=""/>
+        <p:cNvGrpSpPr/>
+        <p:nvPr/>
+      </p:nvGrpSpPr>
+      <p:grpSpPr>
+        <a:xfrm>
+          <a:off x="0" y="0"/>
+          <a:ext cx="0" cy="0"/>
+          <a:chOff x="0" y="0"/>
+          <a:chExt cx="0" cy="0"/>
+        </a:xfrm>
+      </p:grpSpPr>
+      <p:sp>
+        <p:nvSpPr>
+          <p:cNvPr id="2" name="Title 1"/>
+          <p:cNvSpPr>
+            <a:spLocks noGrp="1"/>
+          </p:cNvSpPr>
+          <p:nvPr>
+            <p:ph type="title"/>
+          </p:nvPr>
+        </p:nvSpPr>
         <p:spPr/>
         <p:txBody>
           <a:bodyPr/>
@@ -5102,13 +9163,13 @@
             </a:r>
             <a:r>
               <a:rPr lang="en-US" dirty="0">
-                <a:hlinkClick r:id="rId2"/>
+                <a:hlinkClick r:id="rId3"/>
               </a:rPr>
               <a:t>https://infinite-crag-79176.herokuapp.com</a:t>
             </a:r>
             <a:r>
               <a:rPr lang="en-US" dirty="0" smtClean="0">
-                <a:hlinkClick r:id="rId2"/>
+                <a:hlinkClick r:id="rId3"/>
               </a:rPr>
               <a:t>/</a:t>
             </a:r>
@@ -5142,13 +9203,13 @@
             </a:r>
             <a:r>
               <a:rPr lang="en-US" dirty="0">
-                <a:hlinkClick r:id="rId3"/>
+                <a:hlinkClick r:id="rId4"/>
               </a:rPr>
               <a:t>http://brightness-monitor-docs.readthedocs.io/de/latest</a:t>
             </a:r>
             <a:r>
               <a:rPr lang="en-US" dirty="0" smtClean="0">
-                <a:hlinkClick r:id="rId3"/>
+                <a:hlinkClick r:id="rId4"/>
               </a:rPr>
               <a:t>/</a:t>
             </a:r>
@@ -5182,13 +9243,13 @@
             </a:r>
             <a:r>
               <a:rPr lang="en-US" dirty="0">
-                <a:hlinkClick r:id="rId4"/>
+                <a:hlinkClick r:id="rId5"/>
               </a:rPr>
               <a:t>https://brightnessmonitor.github.io</a:t>
             </a:r>
             <a:r>
               <a:rPr lang="en-US" dirty="0" smtClean="0">
-                <a:hlinkClick r:id="rId4"/>
+                <a:hlinkClick r:id="rId5"/>
               </a:rPr>
               <a:t>/</a:t>
             </a:r>
@@ -5237,13 +9298,13 @@
             </a:r>
             <a:r>
               <a:rPr lang="en-US" dirty="0">
-                <a:hlinkClick r:id="rId5"/>
+                <a:hlinkClick r:id="rId6"/>
               </a:rPr>
               <a:t>https://</a:t>
             </a:r>
             <a:r>
               <a:rPr lang="en-US" dirty="0" smtClean="0">
-                <a:hlinkClick r:id="rId5"/>
+                <a:hlinkClick r:id="rId6"/>
               </a:rPr>
               <a:t>github.com/BrightnessMonitor/BrightnessMonitorClient</a:t>
             </a:r>
@@ -5269,13 +9330,13 @@
             </a:r>
             <a:r>
               <a:rPr lang="en-US" dirty="0">
-                <a:hlinkClick r:id="rId6"/>
+                <a:hlinkClick r:id="rId7"/>
               </a:rPr>
               <a:t>https://</a:t>
             </a:r>
             <a:r>
               <a:rPr lang="en-US" dirty="0" smtClean="0">
-                <a:hlinkClick r:id="rId6"/>
+                <a:hlinkClick r:id="rId7"/>
               </a:rPr>
               <a:t>github.com/BrightnessMonitor/BrightnessMonitorWeb</a:t>
             </a:r>
@@ -5305,13 +9366,13 @@
             </a:r>
             <a:r>
               <a:rPr lang="en-US" dirty="0">
-                <a:hlinkClick r:id="rId7"/>
+                <a:hlinkClick r:id="rId8"/>
               </a:rPr>
               <a:t>https://</a:t>
             </a:r>
             <a:r>
               <a:rPr lang="en-US" dirty="0" smtClean="0">
-                <a:hlinkClick r:id="rId7"/>
+                <a:hlinkClick r:id="rId8"/>
               </a:rPr>
               <a:t>github.com/BrightnessMonitor/BrightnessMonitor.github.io</a:t>
             </a:r>
@@ -5329,6 +9390,13 @@
   <p:clrMapOvr>
     <a:masterClrMapping/>
   </p:clrMapOvr>
+  <p:timing>
+    <p:tnLst>
+      <p:par>
+        <p:cTn id="1" dur="indefinite" restart="never" nodeType="tmRoot"/>
+      </p:par>
+    </p:tnLst>
+  </p:timing>
 </p:sld>
 </file>
 
@@ -5551,4 +9619,265 @@
     </a:ext>
   </a:extLst>
 </a:theme>
+</file>
+
+<file path=ppt/theme/theme2.xml><?xml version="1.0" encoding="utf-8"?>
+<a:theme xmlns:a="http://schemas.openxmlformats.org/drawingml/2006/main" name="Office-Design">
+  <a:themeElements>
+    <a:clrScheme name="Office">
+      <a:dk1>
+        <a:sysClr val="windowText" lastClr="000000"/>
+      </a:dk1>
+      <a:lt1>
+        <a:sysClr val="window" lastClr="FFFFFF"/>
+      </a:lt1>
+      <a:dk2>
+        <a:srgbClr val="44546A"/>
+      </a:dk2>
+      <a:lt2>
+        <a:srgbClr val="E7E6E6"/>
+      </a:lt2>
+      <a:accent1>
+        <a:srgbClr val="4472C4"/>
+      </a:accent1>
+      <a:accent2>
+        <a:srgbClr val="ED7D31"/>
+      </a:accent2>
+      <a:accent3>
+        <a:srgbClr val="A5A5A5"/>
+      </a:accent3>
+      <a:accent4>
+        <a:srgbClr val="FFC000"/>
+      </a:accent4>
+      <a:accent5>
+        <a:srgbClr val="5B9BD5"/>
+      </a:accent5>
+      <a:accent6>
+        <a:srgbClr val="70AD47"/>
+      </a:accent6>
+      <a:hlink>
+        <a:srgbClr val="0563C1"/>
+      </a:hlink>
+      <a:folHlink>
+        <a:srgbClr val="954F72"/>
+      </a:folHlink>
+    </a:clrScheme>
+    <a:fontScheme name="Office">
+      <a:majorFont>
+        <a:latin typeface="Calibri Light" panose="020F0302020204030204"/>
+        <a:ea typeface=""/>
+        <a:cs typeface=""/>
+        <a:font script="Jpan" typeface="Yu Gothic Light"/>
+        <a:font script="Hang" typeface="맑은 고딕"/>
+        <a:font script="Hans" typeface="DengXian Light"/>
+        <a:font script="Hant" typeface="新細明體"/>
+        <a:font script="Arab" typeface="Times New Roman"/>
+        <a:font script="Hebr" typeface="Times New Roman"/>
+        <a:font script="Thai" typeface="Angsana New"/>
+        <a:font script="Ethi" typeface="Nyala"/>
+        <a:font script="Beng" typeface="Vrinda"/>
+        <a:font script="Gujr" typeface="Shruti"/>
+        <a:font script="Khmr" typeface="MoolBoran"/>
+        <a:font script="Knda" typeface="Tunga"/>
+        <a:font script="Guru" typeface="Raavi"/>
+        <a:font script="Cans" typeface="Euphemia"/>
+        <a:font script="Cher" typeface="Plantagenet Cherokee"/>
+        <a:font script="Yiii" typeface="Microsoft Yi Baiti"/>
+        <a:font script="Tibt" typeface="Microsoft Himalaya"/>
+        <a:font script="Thaa" typeface="MV Boli"/>
+        <a:font script="Deva" typeface="Mangal"/>
+        <a:font script="Telu" typeface="Gautami"/>
+        <a:font script="Taml" typeface="Latha"/>
+        <a:font script="Syrc" typeface="Estrangelo Edessa"/>
+        <a:font script="Orya" typeface="Kalinga"/>
+        <a:font script="Mlym" typeface="Kartika"/>
+        <a:font script="Laoo" typeface="DokChampa"/>
+        <a:font script="Sinh" typeface="Iskoola Pota"/>
+        <a:font script="Mong" typeface="Mongolian Baiti"/>
+        <a:font script="Viet" typeface="Times New Roman"/>
+        <a:font script="Uigh" typeface="Microsoft Uighur"/>
+        <a:font script="Geor" typeface="Sylfaen"/>
+      </a:majorFont>
+      <a:minorFont>
+        <a:latin typeface="Calibri" panose="020F0502020204030204"/>
+        <a:ea typeface=""/>
+        <a:cs typeface=""/>
+        <a:font script="Jpan" typeface="Yu Gothic"/>
+        <a:font script="Hang" typeface="맑은 고딕"/>
+        <a:font script="Hans" typeface="DengXian"/>
+        <a:font script="Hant" typeface="新細明體"/>
+        <a:font script="Arab" typeface="Arial"/>
+        <a:font script="Hebr" typeface="Arial"/>
+        <a:font script="Thai" typeface="Cordia New"/>
+        <a:font script="Ethi" typeface="Nyala"/>
+        <a:font script="Beng" typeface="Vrinda"/>
+        <a:font script="Gujr" typeface="Shruti"/>
+        <a:font script="Khmr" typeface="DaunPenh"/>
+        <a:font script="Knda" typeface="Tunga"/>
+        <a:font script="Guru" typeface="Raavi"/>
+        <a:font script="Cans" typeface="Euphemia"/>
+        <a:font script="Cher" typeface="Plantagenet Cherokee"/>
+        <a:font script="Yiii" typeface="Microsoft Yi Baiti"/>
+        <a:font script="Tibt" typeface="Microsoft Himalaya"/>
+        <a:font script="Thaa" typeface="MV Boli"/>
+        <a:font script="Deva" typeface="Mangal"/>
+        <a:font script="Telu" typeface="Gautami"/>
+        <a:font script="Taml" typeface="Latha"/>
+        <a:font script="Syrc" typeface="Estrangelo Edessa"/>
+        <a:font script="Orya" typeface="Kalinga"/>
+        <a:font script="Mlym" typeface="Kartika"/>
+        <a:font script="Laoo" typeface="DokChampa"/>
+        <a:font script="Sinh" typeface="Iskoola Pota"/>
+        <a:font script="Mong" typeface="Mongolian Baiti"/>
+        <a:font script="Viet" typeface="Arial"/>
+        <a:font script="Uigh" typeface="Microsoft Uighur"/>
+        <a:font script="Geor" typeface="Sylfaen"/>
+      </a:minorFont>
+    </a:fontScheme>
+    <a:fmtScheme name="Office">
+      <a:fillStyleLst>
+        <a:solidFill>
+          <a:schemeClr val="phClr"/>
+        </a:solidFill>
+        <a:gradFill rotWithShape="1">
+          <a:gsLst>
+            <a:gs pos="0">
+              <a:schemeClr val="phClr">
+                <a:lumMod val="110000"/>
+                <a:satMod val="105000"/>
+                <a:tint val="67000"/>
+              </a:schemeClr>
+            </a:gs>
+            <a:gs pos="50000">
+              <a:schemeClr val="phClr">
+                <a:lumMod val="105000"/>
+                <a:satMod val="103000"/>
+                <a:tint val="73000"/>
+              </a:schemeClr>
+            </a:gs>
+            <a:gs pos="100000">
+              <a:schemeClr val="phClr">
+                <a:lumMod val="105000"/>
+                <a:satMod val="109000"/>
+                <a:tint val="81000"/>
+              </a:schemeClr>
+            </a:gs>
+          </a:gsLst>
+          <a:lin ang="5400000" scaled="0"/>
+        </a:gradFill>
+        <a:gradFill rotWithShape="1">
+          <a:gsLst>
+            <a:gs pos="0">
+              <a:schemeClr val="phClr">
+                <a:satMod val="103000"/>
+                <a:lumMod val="102000"/>
+                <a:tint val="94000"/>
+              </a:schemeClr>
+            </a:gs>
+            <a:gs pos="50000">
+              <a:schemeClr val="phClr">
+                <a:satMod val="110000"/>
+                <a:lumMod val="100000"/>
+                <a:shade val="100000"/>
+              </a:schemeClr>
+            </a:gs>
+            <a:gs pos="100000">
+              <a:schemeClr val="phClr">
+                <a:lumMod val="99000"/>
+                <a:satMod val="120000"/>
+                <a:shade val="78000"/>
+              </a:schemeClr>
+            </a:gs>
+          </a:gsLst>
+          <a:lin ang="5400000" scaled="0"/>
+        </a:gradFill>
+      </a:fillStyleLst>
+      <a:lnStyleLst>
+        <a:ln w="6350" cap="flat" cmpd="sng" algn="ctr">
+          <a:solidFill>
+            <a:schemeClr val="phClr"/>
+          </a:solidFill>
+          <a:prstDash val="solid"/>
+          <a:miter lim="800000"/>
+        </a:ln>
+        <a:ln w="12700" cap="flat" cmpd="sng" algn="ctr">
+          <a:solidFill>
+            <a:schemeClr val="phClr"/>
+          </a:solidFill>
+          <a:prstDash val="solid"/>
+          <a:miter lim="800000"/>
+        </a:ln>
+        <a:ln w="19050" cap="flat" cmpd="sng" algn="ctr">
+          <a:solidFill>
+            <a:schemeClr val="phClr"/>
+          </a:solidFill>
+          <a:prstDash val="solid"/>
+          <a:miter lim="800000"/>
+        </a:ln>
+      </a:lnStyleLst>
+      <a:effectStyleLst>
+        <a:effectStyle>
+          <a:effectLst/>
+        </a:effectStyle>
+        <a:effectStyle>
+          <a:effectLst/>
+        </a:effectStyle>
+        <a:effectStyle>
+          <a:effectLst>
+            <a:outerShdw blurRad="57150" dist="19050" dir="5400000" algn="ctr" rotWithShape="0">
+              <a:srgbClr val="000000">
+                <a:alpha val="63000"/>
+              </a:srgbClr>
+            </a:outerShdw>
+          </a:effectLst>
+        </a:effectStyle>
+      </a:effectStyleLst>
+      <a:bgFillStyleLst>
+        <a:solidFill>
+          <a:schemeClr val="phClr"/>
+        </a:solidFill>
+        <a:solidFill>
+          <a:schemeClr val="phClr">
+            <a:tint val="95000"/>
+            <a:satMod val="170000"/>
+          </a:schemeClr>
+        </a:solidFill>
+        <a:gradFill rotWithShape="1">
+          <a:gsLst>
+            <a:gs pos="0">
+              <a:schemeClr val="phClr">
+                <a:tint val="93000"/>
+                <a:satMod val="150000"/>
+                <a:shade val="98000"/>
+                <a:lumMod val="102000"/>
+              </a:schemeClr>
+            </a:gs>
+            <a:gs pos="50000">
+              <a:schemeClr val="phClr">
+                <a:tint val="98000"/>
+                <a:satMod val="130000"/>
+                <a:shade val="90000"/>
+                <a:lumMod val="103000"/>
+              </a:schemeClr>
+            </a:gs>
+            <a:gs pos="100000">
+              <a:schemeClr val="phClr">
+                <a:shade val="63000"/>
+                <a:satMod val="120000"/>
+              </a:schemeClr>
+            </a:gs>
+          </a:gsLst>
+          <a:lin ang="5400000" scaled="0"/>
+        </a:gradFill>
+      </a:bgFillStyleLst>
+    </a:fmtScheme>
+  </a:themeElements>
+  <a:objectDefaults/>
+  <a:extraClrSchemeLst/>
+  <a:extLst>
+    <a:ext uri="{05A4C25C-085E-4340-85A3-A5531E510DB2}">
+      <thm15:themeFamily xmlns:thm15="http://schemas.microsoft.com/office/thememl/2012/main" name="Office Theme" id="{62F939B6-93AF-4DB8-9C6B-D6C7DFDC589F}" vid="{4A3C46E8-61CC-4603-A589-7422A47A8E4A}"/>
+    </a:ext>
+  </a:extLst>
+</a:theme>
 </file>
</xml_diff>